<commit_message>
update data flow schematic
shows how data flows and what each code does
</commit_message>
<xml_diff>
--- a/Documents/SWIFT_dataflow.pptx
+++ b/Documents/SWIFT_dataflow.pptx
@@ -106,6 +106,22 @@
       </a:defRPr>
     </a:lvl9pPr>
   </p:defaultTextStyle>
+  <p:extLst>
+    <p:ext uri="{EFAFB233-063F-42B5-8137-9DF3F51BA10A}">
+      <p15:sldGuideLst xmlns:p15="http://schemas.microsoft.com/office/powerpoint/2012/main">
+        <p15:guide id="1" orient="horz" pos="2880">
+          <p15:clr>
+            <a:srgbClr val="A4A3A4"/>
+          </p15:clr>
+        </p15:guide>
+        <p15:guide id="2" pos="2160">
+          <p15:clr>
+            <a:srgbClr val="A4A3A4"/>
+          </p15:clr>
+        </p15:guide>
+      </p15:sldGuideLst>
+    </p:ext>
+  </p:extLst>
 </p:presentation>
 </file>
 
@@ -147,10 +163,9 @@
           <a:lstStyle/>
           <a:p>
             <a:r>
-              <a:rPr lang="en-US" smtClean="0"/>
+              <a:rPr lang="en-US"/>
               <a:t>Click to edit Master title style</a:t>
             </a:r>
-            <a:endParaRPr lang="en-US"/>
           </a:p>
         </p:txBody>
       </p:sp>
@@ -266,10 +281,9 @@
           </a:lstStyle>
           <a:p>
             <a:r>
-              <a:rPr lang="en-US" smtClean="0"/>
+              <a:rPr lang="en-US"/>
               <a:t>Click to edit Master subtitle style</a:t>
             </a:r>
-            <a:endParaRPr lang="en-US"/>
           </a:p>
         </p:txBody>
       </p:sp>
@@ -290,7 +304,7 @@
           <a:p>
             <a:fld id="{2E171799-5A7F-B949-9A22-9A7E827F425E}" type="datetimeFigureOut">
               <a:rPr lang="en-US" smtClean="0"/>
-              <a:t>12/15/17</a:t>
+              <a:t>8/15/19</a:t>
             </a:fld>
             <a:endParaRPr lang="en-US"/>
           </a:p>
@@ -384,10 +398,9 @@
           <a:lstStyle/>
           <a:p>
             <a:r>
-              <a:rPr lang="en-US" smtClean="0"/>
+              <a:rPr lang="en-US"/>
               <a:t>Click to edit Master title style</a:t>
             </a:r>
-            <a:endParaRPr lang="en-US"/>
           </a:p>
         </p:txBody>
       </p:sp>
@@ -408,38 +421,37 @@
           <a:p>
             <a:pPr lvl="0"/>
             <a:r>
-              <a:rPr lang="en-US" smtClean="0"/>
+              <a:rPr lang="en-US"/>
               <a:t>Click to edit Master text styles</a:t>
             </a:r>
           </a:p>
           <a:p>
             <a:pPr lvl="1"/>
             <a:r>
-              <a:rPr lang="en-US" smtClean="0"/>
+              <a:rPr lang="en-US"/>
               <a:t>Second level</a:t>
             </a:r>
           </a:p>
           <a:p>
             <a:pPr lvl="2"/>
             <a:r>
-              <a:rPr lang="en-US" smtClean="0"/>
+              <a:rPr lang="en-US"/>
               <a:t>Third level</a:t>
             </a:r>
           </a:p>
           <a:p>
             <a:pPr lvl="3"/>
             <a:r>
-              <a:rPr lang="en-US" smtClean="0"/>
+              <a:rPr lang="en-US"/>
               <a:t>Fourth level</a:t>
             </a:r>
           </a:p>
           <a:p>
             <a:pPr lvl="4"/>
             <a:r>
-              <a:rPr lang="en-US" smtClean="0"/>
+              <a:rPr lang="en-US"/>
               <a:t>Fifth level</a:t>
             </a:r>
-            <a:endParaRPr lang="en-US"/>
           </a:p>
         </p:txBody>
       </p:sp>
@@ -460,7 +472,7 @@
           <a:p>
             <a:fld id="{2E171799-5A7F-B949-9A22-9A7E827F425E}" type="datetimeFigureOut">
               <a:rPr lang="en-US" smtClean="0"/>
-              <a:t>12/15/17</a:t>
+              <a:t>8/15/19</a:t>
             </a:fld>
             <a:endParaRPr lang="en-US"/>
           </a:p>
@@ -559,10 +571,9 @@
           <a:lstStyle/>
           <a:p>
             <a:r>
-              <a:rPr lang="en-US" smtClean="0"/>
+              <a:rPr lang="en-US"/>
               <a:t>Click to edit Master title style</a:t>
             </a:r>
-            <a:endParaRPr lang="en-US"/>
           </a:p>
         </p:txBody>
       </p:sp>
@@ -588,38 +599,37 @@
           <a:p>
             <a:pPr lvl="0"/>
             <a:r>
-              <a:rPr lang="en-US" smtClean="0"/>
+              <a:rPr lang="en-US"/>
               <a:t>Click to edit Master text styles</a:t>
             </a:r>
           </a:p>
           <a:p>
             <a:pPr lvl="1"/>
             <a:r>
-              <a:rPr lang="en-US" smtClean="0"/>
+              <a:rPr lang="en-US"/>
               <a:t>Second level</a:t>
             </a:r>
           </a:p>
           <a:p>
             <a:pPr lvl="2"/>
             <a:r>
-              <a:rPr lang="en-US" smtClean="0"/>
+              <a:rPr lang="en-US"/>
               <a:t>Third level</a:t>
             </a:r>
           </a:p>
           <a:p>
             <a:pPr lvl="3"/>
             <a:r>
-              <a:rPr lang="en-US" smtClean="0"/>
+              <a:rPr lang="en-US"/>
               <a:t>Fourth level</a:t>
             </a:r>
           </a:p>
           <a:p>
             <a:pPr lvl="4"/>
             <a:r>
-              <a:rPr lang="en-US" smtClean="0"/>
+              <a:rPr lang="en-US"/>
               <a:t>Fifth level</a:t>
             </a:r>
-            <a:endParaRPr lang="en-US"/>
           </a:p>
         </p:txBody>
       </p:sp>
@@ -640,7 +650,7 @@
           <a:p>
             <a:fld id="{2E171799-5A7F-B949-9A22-9A7E827F425E}" type="datetimeFigureOut">
               <a:rPr lang="en-US" smtClean="0"/>
-              <a:t>12/15/17</a:t>
+              <a:t>8/15/19</a:t>
             </a:fld>
             <a:endParaRPr lang="en-US"/>
           </a:p>
@@ -734,10 +744,9 @@
           <a:lstStyle/>
           <a:p>
             <a:r>
-              <a:rPr lang="en-US" smtClean="0"/>
+              <a:rPr lang="en-US"/>
               <a:t>Click to edit Master title style</a:t>
             </a:r>
-            <a:endParaRPr lang="en-US"/>
           </a:p>
         </p:txBody>
       </p:sp>
@@ -758,38 +767,37 @@
           <a:p>
             <a:pPr lvl="0"/>
             <a:r>
-              <a:rPr lang="en-US" smtClean="0"/>
+              <a:rPr lang="en-US"/>
               <a:t>Click to edit Master text styles</a:t>
             </a:r>
           </a:p>
           <a:p>
             <a:pPr lvl="1"/>
             <a:r>
-              <a:rPr lang="en-US" smtClean="0"/>
+              <a:rPr lang="en-US"/>
               <a:t>Second level</a:t>
             </a:r>
           </a:p>
           <a:p>
             <a:pPr lvl="2"/>
             <a:r>
-              <a:rPr lang="en-US" smtClean="0"/>
+              <a:rPr lang="en-US"/>
               <a:t>Third level</a:t>
             </a:r>
           </a:p>
           <a:p>
             <a:pPr lvl="3"/>
             <a:r>
-              <a:rPr lang="en-US" smtClean="0"/>
+              <a:rPr lang="en-US"/>
               <a:t>Fourth level</a:t>
             </a:r>
           </a:p>
           <a:p>
             <a:pPr lvl="4"/>
             <a:r>
-              <a:rPr lang="en-US" smtClean="0"/>
+              <a:rPr lang="en-US"/>
               <a:t>Fifth level</a:t>
             </a:r>
-            <a:endParaRPr lang="en-US"/>
           </a:p>
         </p:txBody>
       </p:sp>
@@ -810,7 +818,7 @@
           <a:p>
             <a:fld id="{2E171799-5A7F-B949-9A22-9A7E827F425E}" type="datetimeFigureOut">
               <a:rPr lang="en-US" smtClean="0"/>
-              <a:t>12/15/17</a:t>
+              <a:t>8/15/19</a:t>
             </a:fld>
             <a:endParaRPr lang="en-US"/>
           </a:p>
@@ -913,10 +921,9 @@
           </a:lstStyle>
           <a:p>
             <a:r>
-              <a:rPr lang="en-US" smtClean="0"/>
+              <a:rPr lang="en-US"/>
               <a:t>Click to edit Master title style</a:t>
             </a:r>
-            <a:endParaRPr lang="en-US"/>
           </a:p>
         </p:txBody>
       </p:sp>
@@ -1033,7 +1040,7 @@
           <a:p>
             <a:pPr lvl="0"/>
             <a:r>
-              <a:rPr lang="en-US" smtClean="0"/>
+              <a:rPr lang="en-US"/>
               <a:t>Click to edit Master text styles</a:t>
             </a:r>
           </a:p>
@@ -1056,7 +1063,7 @@
           <a:p>
             <a:fld id="{2E171799-5A7F-B949-9A22-9A7E827F425E}" type="datetimeFigureOut">
               <a:rPr lang="en-US" smtClean="0"/>
-              <a:t>12/15/17</a:t>
+              <a:t>8/15/19</a:t>
             </a:fld>
             <a:endParaRPr lang="en-US"/>
           </a:p>
@@ -1150,10 +1157,9 @@
           <a:lstStyle/>
           <a:p>
             <a:r>
-              <a:rPr lang="en-US" smtClean="0"/>
+              <a:rPr lang="en-US"/>
               <a:t>Click to edit Master title style</a:t>
             </a:r>
-            <a:endParaRPr lang="en-US"/>
           </a:p>
         </p:txBody>
       </p:sp>
@@ -1207,38 +1213,37 @@
           <a:p>
             <a:pPr lvl="0"/>
             <a:r>
-              <a:rPr lang="en-US" smtClean="0"/>
+              <a:rPr lang="en-US"/>
               <a:t>Click to edit Master text styles</a:t>
             </a:r>
           </a:p>
           <a:p>
             <a:pPr lvl="1"/>
             <a:r>
-              <a:rPr lang="en-US" smtClean="0"/>
+              <a:rPr lang="en-US"/>
               <a:t>Second level</a:t>
             </a:r>
           </a:p>
           <a:p>
             <a:pPr lvl="2"/>
             <a:r>
-              <a:rPr lang="en-US" smtClean="0"/>
+              <a:rPr lang="en-US"/>
               <a:t>Third level</a:t>
             </a:r>
           </a:p>
           <a:p>
             <a:pPr lvl="3"/>
             <a:r>
-              <a:rPr lang="en-US" smtClean="0"/>
+              <a:rPr lang="en-US"/>
               <a:t>Fourth level</a:t>
             </a:r>
           </a:p>
           <a:p>
             <a:pPr lvl="4"/>
             <a:r>
-              <a:rPr lang="en-US" smtClean="0"/>
+              <a:rPr lang="en-US"/>
               <a:t>Fifth level</a:t>
             </a:r>
-            <a:endParaRPr lang="en-US"/>
           </a:p>
         </p:txBody>
       </p:sp>
@@ -1292,38 +1297,37 @@
           <a:p>
             <a:pPr lvl="0"/>
             <a:r>
-              <a:rPr lang="en-US" smtClean="0"/>
+              <a:rPr lang="en-US"/>
               <a:t>Click to edit Master text styles</a:t>
             </a:r>
           </a:p>
           <a:p>
             <a:pPr lvl="1"/>
             <a:r>
-              <a:rPr lang="en-US" smtClean="0"/>
+              <a:rPr lang="en-US"/>
               <a:t>Second level</a:t>
             </a:r>
           </a:p>
           <a:p>
             <a:pPr lvl="2"/>
             <a:r>
-              <a:rPr lang="en-US" smtClean="0"/>
+              <a:rPr lang="en-US"/>
               <a:t>Third level</a:t>
             </a:r>
           </a:p>
           <a:p>
             <a:pPr lvl="3"/>
             <a:r>
-              <a:rPr lang="en-US" smtClean="0"/>
+              <a:rPr lang="en-US"/>
               <a:t>Fourth level</a:t>
             </a:r>
           </a:p>
           <a:p>
             <a:pPr lvl="4"/>
             <a:r>
-              <a:rPr lang="en-US" smtClean="0"/>
+              <a:rPr lang="en-US"/>
               <a:t>Fifth level</a:t>
             </a:r>
-            <a:endParaRPr lang="en-US"/>
           </a:p>
         </p:txBody>
       </p:sp>
@@ -1344,7 +1348,7 @@
           <a:p>
             <a:fld id="{2E171799-5A7F-B949-9A22-9A7E827F425E}" type="datetimeFigureOut">
               <a:rPr lang="en-US" smtClean="0"/>
-              <a:t>12/15/17</a:t>
+              <a:t>8/15/19</a:t>
             </a:fld>
             <a:endParaRPr lang="en-US"/>
           </a:p>
@@ -1447,10 +1451,9 @@
           </a:lstStyle>
           <a:p>
             <a:r>
-              <a:rPr lang="en-US" smtClean="0"/>
+              <a:rPr lang="en-US"/>
               <a:t>Click to edit Master title style</a:t>
             </a:r>
-            <a:endParaRPr lang="en-US"/>
           </a:p>
         </p:txBody>
       </p:sp>
@@ -1513,7 +1516,7 @@
           <a:p>
             <a:pPr lvl="0"/>
             <a:r>
-              <a:rPr lang="en-US" smtClean="0"/>
+              <a:rPr lang="en-US"/>
               <a:t>Click to edit Master text styles</a:t>
             </a:r>
           </a:p>
@@ -1569,38 +1572,37 @@
           <a:p>
             <a:pPr lvl="0"/>
             <a:r>
-              <a:rPr lang="en-US" smtClean="0"/>
+              <a:rPr lang="en-US"/>
               <a:t>Click to edit Master text styles</a:t>
             </a:r>
           </a:p>
           <a:p>
             <a:pPr lvl="1"/>
             <a:r>
-              <a:rPr lang="en-US" smtClean="0"/>
+              <a:rPr lang="en-US"/>
               <a:t>Second level</a:t>
             </a:r>
           </a:p>
           <a:p>
             <a:pPr lvl="2"/>
             <a:r>
-              <a:rPr lang="en-US" smtClean="0"/>
+              <a:rPr lang="en-US"/>
               <a:t>Third level</a:t>
             </a:r>
           </a:p>
           <a:p>
             <a:pPr lvl="3"/>
             <a:r>
-              <a:rPr lang="en-US" smtClean="0"/>
+              <a:rPr lang="en-US"/>
               <a:t>Fourth level</a:t>
             </a:r>
           </a:p>
           <a:p>
             <a:pPr lvl="4"/>
             <a:r>
-              <a:rPr lang="en-US" smtClean="0"/>
+              <a:rPr lang="en-US"/>
               <a:t>Fifth level</a:t>
             </a:r>
-            <a:endParaRPr lang="en-US"/>
           </a:p>
         </p:txBody>
       </p:sp>
@@ -1663,7 +1665,7 @@
           <a:p>
             <a:pPr lvl="0"/>
             <a:r>
-              <a:rPr lang="en-US" smtClean="0"/>
+              <a:rPr lang="en-US"/>
               <a:t>Click to edit Master text styles</a:t>
             </a:r>
           </a:p>
@@ -1719,38 +1721,37 @@
           <a:p>
             <a:pPr lvl="0"/>
             <a:r>
-              <a:rPr lang="en-US" smtClean="0"/>
+              <a:rPr lang="en-US"/>
               <a:t>Click to edit Master text styles</a:t>
             </a:r>
           </a:p>
           <a:p>
             <a:pPr lvl="1"/>
             <a:r>
-              <a:rPr lang="en-US" smtClean="0"/>
+              <a:rPr lang="en-US"/>
               <a:t>Second level</a:t>
             </a:r>
           </a:p>
           <a:p>
             <a:pPr lvl="2"/>
             <a:r>
-              <a:rPr lang="en-US" smtClean="0"/>
+              <a:rPr lang="en-US"/>
               <a:t>Third level</a:t>
             </a:r>
           </a:p>
           <a:p>
             <a:pPr lvl="3"/>
             <a:r>
-              <a:rPr lang="en-US" smtClean="0"/>
+              <a:rPr lang="en-US"/>
               <a:t>Fourth level</a:t>
             </a:r>
           </a:p>
           <a:p>
             <a:pPr lvl="4"/>
             <a:r>
-              <a:rPr lang="en-US" smtClean="0"/>
+              <a:rPr lang="en-US"/>
               <a:t>Fifth level</a:t>
             </a:r>
-            <a:endParaRPr lang="en-US"/>
           </a:p>
         </p:txBody>
       </p:sp>
@@ -1771,7 +1772,7 @@
           <a:p>
             <a:fld id="{2E171799-5A7F-B949-9A22-9A7E827F425E}" type="datetimeFigureOut">
               <a:rPr lang="en-US" smtClean="0"/>
-              <a:t>12/15/17</a:t>
+              <a:t>8/15/19</a:t>
             </a:fld>
             <a:endParaRPr lang="en-US"/>
           </a:p>
@@ -1865,10 +1866,9 @@
           <a:lstStyle/>
           <a:p>
             <a:r>
-              <a:rPr lang="en-US" smtClean="0"/>
+              <a:rPr lang="en-US"/>
               <a:t>Click to edit Master title style</a:t>
             </a:r>
-            <a:endParaRPr lang="en-US"/>
           </a:p>
         </p:txBody>
       </p:sp>
@@ -1889,7 +1889,7 @@
           <a:p>
             <a:fld id="{2E171799-5A7F-B949-9A22-9A7E827F425E}" type="datetimeFigureOut">
               <a:rPr lang="en-US" smtClean="0"/>
-              <a:t>12/15/17</a:t>
+              <a:t>8/15/19</a:t>
             </a:fld>
             <a:endParaRPr lang="en-US"/>
           </a:p>
@@ -1984,7 +1984,7 @@
           <a:p>
             <a:fld id="{2E171799-5A7F-B949-9A22-9A7E827F425E}" type="datetimeFigureOut">
               <a:rPr lang="en-US" smtClean="0"/>
-              <a:t>12/15/17</a:t>
+              <a:t>8/15/19</a:t>
             </a:fld>
             <a:endParaRPr lang="en-US"/>
           </a:p>
@@ -2087,10 +2087,9 @@
           </a:lstStyle>
           <a:p>
             <a:r>
-              <a:rPr lang="en-US" smtClean="0"/>
+              <a:rPr lang="en-US"/>
               <a:t>Click to edit Master title style</a:t>
             </a:r>
-            <a:endParaRPr lang="en-US"/>
           </a:p>
         </p:txBody>
       </p:sp>
@@ -2144,38 +2143,37 @@
           <a:p>
             <a:pPr lvl="0"/>
             <a:r>
-              <a:rPr lang="en-US" smtClean="0"/>
+              <a:rPr lang="en-US"/>
               <a:t>Click to edit Master text styles</a:t>
             </a:r>
           </a:p>
           <a:p>
             <a:pPr lvl="1"/>
             <a:r>
-              <a:rPr lang="en-US" smtClean="0"/>
+              <a:rPr lang="en-US"/>
               <a:t>Second level</a:t>
             </a:r>
           </a:p>
           <a:p>
             <a:pPr lvl="2"/>
             <a:r>
-              <a:rPr lang="en-US" smtClean="0"/>
+              <a:rPr lang="en-US"/>
               <a:t>Third level</a:t>
             </a:r>
           </a:p>
           <a:p>
             <a:pPr lvl="3"/>
             <a:r>
-              <a:rPr lang="en-US" smtClean="0"/>
+              <a:rPr lang="en-US"/>
               <a:t>Fourth level</a:t>
             </a:r>
           </a:p>
           <a:p>
             <a:pPr lvl="4"/>
             <a:r>
-              <a:rPr lang="en-US" smtClean="0"/>
+              <a:rPr lang="en-US"/>
               <a:t>Fifth level</a:t>
             </a:r>
-            <a:endParaRPr lang="en-US"/>
           </a:p>
         </p:txBody>
       </p:sp>
@@ -2238,7 +2236,7 @@
           <a:p>
             <a:pPr lvl="0"/>
             <a:r>
-              <a:rPr lang="en-US" smtClean="0"/>
+              <a:rPr lang="en-US"/>
               <a:t>Click to edit Master text styles</a:t>
             </a:r>
           </a:p>
@@ -2261,7 +2259,7 @@
           <a:p>
             <a:fld id="{2E171799-5A7F-B949-9A22-9A7E827F425E}" type="datetimeFigureOut">
               <a:rPr lang="en-US" smtClean="0"/>
-              <a:t>12/15/17</a:t>
+              <a:t>8/15/19</a:t>
             </a:fld>
             <a:endParaRPr lang="en-US"/>
           </a:p>
@@ -2364,10 +2362,9 @@
           </a:lstStyle>
           <a:p>
             <a:r>
-              <a:rPr lang="en-US" smtClean="0"/>
+              <a:rPr lang="en-US"/>
               <a:t>Click to edit Master title style</a:t>
             </a:r>
-            <a:endParaRPr lang="en-US"/>
           </a:p>
         </p:txBody>
       </p:sp>
@@ -2491,7 +2488,7 @@
           <a:p>
             <a:pPr lvl="0"/>
             <a:r>
-              <a:rPr lang="en-US" smtClean="0"/>
+              <a:rPr lang="en-US"/>
               <a:t>Click to edit Master text styles</a:t>
             </a:r>
           </a:p>
@@ -2514,7 +2511,7 @@
           <a:p>
             <a:fld id="{2E171799-5A7F-B949-9A22-9A7E827F425E}" type="datetimeFigureOut">
               <a:rPr lang="en-US" smtClean="0"/>
-              <a:t>12/15/17</a:t>
+              <a:t>8/15/19</a:t>
             </a:fld>
             <a:endParaRPr lang="en-US"/>
           </a:p>
@@ -2623,10 +2620,9 @@
           <a:lstStyle/>
           <a:p>
             <a:r>
-              <a:rPr lang="en-US" smtClean="0"/>
+              <a:rPr lang="en-US"/>
               <a:t>Click to edit Master title style</a:t>
             </a:r>
-            <a:endParaRPr lang="en-US"/>
           </a:p>
         </p:txBody>
       </p:sp>
@@ -2657,38 +2653,37 @@
           <a:p>
             <a:pPr lvl="0"/>
             <a:r>
-              <a:rPr lang="en-US" smtClean="0"/>
+              <a:rPr lang="en-US"/>
               <a:t>Click to edit Master text styles</a:t>
             </a:r>
           </a:p>
           <a:p>
             <a:pPr lvl="1"/>
             <a:r>
-              <a:rPr lang="en-US" smtClean="0"/>
+              <a:rPr lang="en-US"/>
               <a:t>Second level</a:t>
             </a:r>
           </a:p>
           <a:p>
             <a:pPr lvl="2"/>
             <a:r>
-              <a:rPr lang="en-US" smtClean="0"/>
+              <a:rPr lang="en-US"/>
               <a:t>Third level</a:t>
             </a:r>
           </a:p>
           <a:p>
             <a:pPr lvl="3"/>
             <a:r>
-              <a:rPr lang="en-US" smtClean="0"/>
+              <a:rPr lang="en-US"/>
               <a:t>Fourth level</a:t>
             </a:r>
           </a:p>
           <a:p>
             <a:pPr lvl="4"/>
             <a:r>
-              <a:rPr lang="en-US" smtClean="0"/>
+              <a:rPr lang="en-US"/>
               <a:t>Fifth level</a:t>
             </a:r>
-            <a:endParaRPr lang="en-US"/>
           </a:p>
         </p:txBody>
       </p:sp>
@@ -2727,7 +2722,7 @@
           <a:p>
             <a:fld id="{2E171799-5A7F-B949-9A22-9A7E827F425E}" type="datetimeFigureOut">
               <a:rPr lang="en-US" smtClean="0"/>
-              <a:t>12/15/17</a:t>
+              <a:t>8/15/19</a:t>
             </a:fld>
             <a:endParaRPr lang="en-US"/>
           </a:p>
@@ -3126,18 +3121,17 @@
           <a:p>
             <a:pPr algn="ctr"/>
             <a:r>
-              <a:rPr lang="en-US" sz="2800" u="sng" dirty="0" smtClean="0"/>
+              <a:rPr lang="en-US" sz="2800" u="sng" dirty="0"/>
               <a:t>SWIFT </a:t>
             </a:r>
             <a:r>
-              <a:rPr lang="en-US" sz="2800" b="1" i="1" u="sng" dirty="0" smtClean="0"/>
+              <a:rPr lang="en-US" sz="2800" b="1" i="1" u="sng" dirty="0"/>
               <a:t>real-time </a:t>
             </a:r>
             <a:r>
-              <a:rPr lang="en-US" sz="2800" u="sng" dirty="0" smtClean="0"/>
+              <a:rPr lang="en-US" sz="2800" u="sng" dirty="0"/>
               <a:t>data flow</a:t>
             </a:r>
-            <a:endParaRPr lang="en-US" sz="2800" u="sng" dirty="0"/>
           </a:p>
         </p:txBody>
       </p:sp>
@@ -3169,16 +3163,15 @@
           <a:lstStyle/>
           <a:p>
             <a:r>
-              <a:rPr lang="en-US" dirty="0" smtClean="0"/>
+              <a:rPr lang="en-US" dirty="0"/>
               <a:t>AQH or AQD</a:t>
             </a:r>
           </a:p>
           <a:p>
             <a:r>
-              <a:rPr lang="en-US" dirty="0" smtClean="0"/>
+              <a:rPr lang="en-US" dirty="0"/>
               <a:t>or Signature</a:t>
             </a:r>
-            <a:endParaRPr lang="en-US" dirty="0"/>
           </a:p>
         </p:txBody>
       </p:sp>
@@ -3211,25 +3204,24 @@
           <a:p>
             <a:pPr algn="ctr"/>
             <a:r>
-              <a:rPr lang="en-US" dirty="0" smtClean="0"/>
+              <a:rPr lang="en-US" dirty="0"/>
               <a:t>GPS and IMU</a:t>
             </a:r>
           </a:p>
           <a:p>
             <a:pPr algn="ctr"/>
             <a:r>
-              <a:rPr lang="en-US" sz="1000" dirty="0" smtClean="0"/>
+              <a:rPr lang="en-US" sz="1000" dirty="0"/>
               <a:t>(</a:t>
             </a:r>
             <a:r>
-              <a:rPr lang="en-US" sz="1000" dirty="0" err="1" smtClean="0"/>
+              <a:rPr lang="en-US" sz="1000" dirty="0" err="1"/>
               <a:t>Microstrain</a:t>
             </a:r>
             <a:r>
-              <a:rPr lang="en-US" sz="1000" dirty="0" smtClean="0"/>
+              <a:rPr lang="en-US" sz="1000" dirty="0"/>
               <a:t> or SBG Ellipse)</a:t>
             </a:r>
-            <a:endParaRPr lang="en-US" sz="1000" dirty="0"/>
           </a:p>
         </p:txBody>
       </p:sp>
@@ -3261,10 +3253,9 @@
           <a:lstStyle/>
           <a:p>
             <a:r>
-              <a:rPr lang="en-US" dirty="0" smtClean="0"/>
+              <a:rPr lang="en-US" dirty="0"/>
               <a:t>CT-1</a:t>
             </a:r>
-            <a:endParaRPr lang="en-US" dirty="0"/>
           </a:p>
         </p:txBody>
       </p:sp>
@@ -3297,47 +3288,46 @@
           <a:p>
             <a:pPr algn="ctr"/>
             <a:r>
-              <a:rPr lang="en-US" dirty="0" smtClean="0"/>
+              <a:rPr lang="en-US" dirty="0"/>
               <a:t>Met </a:t>
             </a:r>
           </a:p>
           <a:p>
             <a:pPr algn="ctr"/>
             <a:r>
-              <a:rPr lang="en-US" sz="1000" dirty="0" err="1" smtClean="0"/>
+              <a:rPr lang="en-US" sz="1000" dirty="0" err="1"/>
               <a:t>Airmar</a:t>
             </a:r>
-            <a:endParaRPr lang="en-US" sz="1000" dirty="0" smtClean="0"/>
-          </a:p>
-          <a:p>
-            <a:pPr algn="ctr"/>
-            <a:r>
-              <a:rPr lang="en-US" sz="1000" dirty="0" smtClean="0"/>
+            <a:endParaRPr lang="en-US" sz="1000" dirty="0"/>
+          </a:p>
+          <a:p>
+            <a:pPr algn="ctr"/>
+            <a:r>
+              <a:rPr lang="en-US" sz="1000" dirty="0"/>
               <a:t>or</a:t>
             </a:r>
           </a:p>
           <a:p>
             <a:pPr algn="ctr"/>
             <a:r>
-              <a:rPr lang="en-US" sz="1000" dirty="0" err="1" smtClean="0"/>
+              <a:rPr lang="en-US" sz="1000" dirty="0" err="1"/>
               <a:t>Vaisala</a:t>
             </a:r>
-            <a:endParaRPr lang="en-US" sz="1000" dirty="0" smtClean="0"/>
-          </a:p>
-          <a:p>
-            <a:pPr algn="ctr"/>
-            <a:r>
-              <a:rPr lang="en-US" sz="1000" dirty="0" smtClean="0"/>
+            <a:endParaRPr lang="en-US" sz="1000" dirty="0"/>
+          </a:p>
+          <a:p>
+            <a:pPr algn="ctr"/>
+            <a:r>
+              <a:rPr lang="en-US" sz="1000" dirty="0"/>
               <a:t>or </a:t>
             </a:r>
           </a:p>
           <a:p>
             <a:pPr algn="ctr"/>
             <a:r>
-              <a:rPr lang="en-US" sz="1000" dirty="0" smtClean="0"/>
+              <a:rPr lang="en-US" sz="1000" dirty="0"/>
               <a:t>3D sonic </a:t>
             </a:r>
-            <a:endParaRPr lang="en-US" sz="1000" dirty="0"/>
           </a:p>
         </p:txBody>
       </p:sp>
@@ -3369,10 +3359,9 @@
           <a:lstStyle/>
           <a:p>
             <a:r>
-              <a:rPr lang="en-US" dirty="0" smtClean="0"/>
+              <a:rPr lang="en-US" dirty="0"/>
               <a:t>Camera</a:t>
             </a:r>
-            <a:endParaRPr lang="en-US" dirty="0"/>
           </a:p>
         </p:txBody>
       </p:sp>
@@ -3404,10 +3393,9 @@
           <a:lstStyle/>
           <a:p>
             <a:r>
-              <a:rPr lang="en-US" dirty="0" smtClean="0"/>
+              <a:rPr lang="en-US" dirty="0"/>
               <a:t>CT-2</a:t>
             </a:r>
-            <a:endParaRPr lang="en-US" dirty="0"/>
           </a:p>
         </p:txBody>
       </p:sp>
@@ -3439,10 +3427,9 @@
           <a:lstStyle/>
           <a:p>
             <a:r>
-              <a:rPr lang="en-US" dirty="0" smtClean="0"/>
+              <a:rPr lang="en-US" dirty="0"/>
               <a:t>CT-3</a:t>
             </a:r>
-            <a:endParaRPr lang="en-US" dirty="0"/>
           </a:p>
         </p:txBody>
       </p:sp>
@@ -3514,7 +3501,7 @@
           <a:lstStyle/>
           <a:p>
             <a:r>
-              <a:rPr lang="en-US" sz="1000" dirty="0" smtClean="0">
+              <a:rPr lang="en-US" sz="1000" dirty="0">
                 <a:solidFill>
                   <a:schemeClr val="tx1">
                     <a:lumMod val="50000"/>
@@ -3524,14 +3511,6 @@
               </a:rPr>
               <a:t>optional</a:t>
             </a:r>
-            <a:endParaRPr lang="en-US" sz="1000" dirty="0">
-              <a:solidFill>
-                <a:schemeClr val="tx1">
-                  <a:lumMod val="50000"/>
-                  <a:lumOff val="50000"/>
-                </a:schemeClr>
-              </a:solidFill>
-            </a:endParaRPr>
           </a:p>
         </p:txBody>
       </p:sp>
@@ -3564,33 +3543,32 @@
           <a:p>
             <a:pPr algn="ctr"/>
             <a:r>
-              <a:rPr lang="en-US" dirty="0" smtClean="0"/>
+              <a:rPr lang="en-US" dirty="0"/>
               <a:t>raw files onboard SWIFT </a:t>
             </a:r>
           </a:p>
           <a:p>
             <a:pPr algn="ctr"/>
             <a:r>
-              <a:rPr lang="en-US" dirty="0" smtClean="0"/>
+              <a:rPr lang="en-US" dirty="0"/>
               <a:t>(</a:t>
             </a:r>
             <a:r>
-              <a:rPr lang="en-US" dirty="0" err="1" smtClean="0"/>
+              <a:rPr lang="en-US" dirty="0" err="1"/>
               <a:t>Sutron</a:t>
             </a:r>
             <a:r>
-              <a:rPr lang="en-US" dirty="0" smtClean="0"/>
+              <a:rPr lang="en-US" dirty="0"/>
               <a:t> </a:t>
             </a:r>
             <a:r>
-              <a:rPr lang="en-US" dirty="0" err="1" smtClean="0"/>
+              <a:rPr lang="en-US" dirty="0" err="1"/>
               <a:t>Xpert</a:t>
             </a:r>
             <a:r>
-              <a:rPr lang="en-US" dirty="0" smtClean="0"/>
+              <a:rPr lang="en-US" dirty="0"/>
               <a:t> SD card, directories by com port)</a:t>
             </a:r>
-            <a:endParaRPr lang="en-US" dirty="0"/>
           </a:p>
         </p:txBody>
       </p:sp>
@@ -3623,7 +3601,7 @@
           <a:p>
             <a:pPr algn="ctr"/>
             <a:r>
-              <a:rPr lang="en-US" dirty="0" smtClean="0"/>
+              <a:rPr lang="en-US" dirty="0"/>
               <a:t>processed files onboard SWIFT </a:t>
             </a:r>
           </a:p>
@@ -3634,22 +3612,21 @@
               <a:t>(</a:t>
             </a:r>
             <a:r>
-              <a:rPr lang="en-US" dirty="0" err="1" smtClean="0"/>
+              <a:rPr lang="en-US" dirty="0" err="1"/>
               <a:t>Sutron</a:t>
             </a:r>
             <a:r>
-              <a:rPr lang="en-US" dirty="0" smtClean="0"/>
+              <a:rPr lang="en-US" dirty="0"/>
               <a:t> </a:t>
             </a:r>
             <a:r>
-              <a:rPr lang="en-US" dirty="0" err="1" smtClean="0"/>
+              <a:rPr lang="en-US" dirty="0" err="1"/>
               <a:t>Xpert</a:t>
             </a:r>
             <a:r>
-              <a:rPr lang="en-US" dirty="0" smtClean="0"/>
+              <a:rPr lang="en-US" dirty="0"/>
               <a:t> SD card, directories by com port)</a:t>
             </a:r>
-            <a:endParaRPr lang="en-US" dirty="0"/>
           </a:p>
         </p:txBody>
       </p:sp>
@@ -3753,38 +3730,37 @@
           <a:p>
             <a:pPr algn="ctr"/>
             <a:r>
-              <a:rPr lang="en-US" sz="1000" dirty="0" smtClean="0"/>
+              <a:rPr lang="en-US" sz="1000" dirty="0"/>
               <a:t>Dissipation rate profile (AQH)</a:t>
             </a:r>
           </a:p>
           <a:p>
             <a:pPr algn="ctr"/>
             <a:r>
-              <a:rPr lang="en-US" sz="1000" dirty="0" smtClean="0"/>
+              <a:rPr lang="en-US" sz="1000" dirty="0"/>
               <a:t>or </a:t>
             </a:r>
           </a:p>
           <a:p>
             <a:pPr algn="ctr"/>
             <a:r>
-              <a:rPr lang="en-US" sz="1000" dirty="0" smtClean="0"/>
+              <a:rPr lang="en-US" sz="1000" dirty="0"/>
               <a:t>current profile (AQD)</a:t>
             </a:r>
           </a:p>
           <a:p>
             <a:pPr algn="ctr"/>
             <a:r>
-              <a:rPr lang="en-US" sz="1000" dirty="0" smtClean="0"/>
+              <a:rPr lang="en-US" sz="1000" dirty="0"/>
               <a:t>or </a:t>
             </a:r>
           </a:p>
           <a:p>
             <a:pPr algn="ctr"/>
             <a:r>
-              <a:rPr lang="en-US" sz="1000" dirty="0" smtClean="0"/>
+              <a:rPr lang="en-US" sz="1000" dirty="0"/>
               <a:t>dissipation + currents (Sig)</a:t>
             </a:r>
-            <a:endParaRPr lang="en-US" sz="1000" dirty="0"/>
           </a:p>
         </p:txBody>
       </p:sp>
@@ -3812,21 +3788,21 @@
           <a:p>
             <a:pPr algn="ctr"/>
             <a:r>
-              <a:rPr lang="en-US" sz="1000" dirty="0" smtClean="0"/>
+              <a:rPr lang="en-US" sz="1000" dirty="0"/>
               <a:t>serial</a:t>
             </a:r>
           </a:p>
           <a:p>
             <a:pPr algn="ctr"/>
             <a:r>
-              <a:rPr lang="en-US" sz="1000" dirty="0" smtClean="0"/>
+              <a:rPr lang="en-US" sz="1000" dirty="0"/>
               <a:t>4 Hz or 1 Hz binary</a:t>
             </a:r>
           </a:p>
           <a:p>
             <a:pPr algn="ctr"/>
             <a:r>
-              <a:rPr lang="en-US" sz="1000" dirty="0" smtClean="0"/>
+              <a:rPr lang="en-US" sz="1000" dirty="0"/>
               <a:t>or 8 Hz binary</a:t>
             </a:r>
           </a:p>
@@ -3861,41 +3837,41 @@
           <a:p>
             <a:pPr algn="ctr"/>
             <a:r>
-              <a:rPr lang="en-US" dirty="0" smtClean="0"/>
+              <a:rPr lang="en-US" dirty="0"/>
               <a:t>Database of received telemetry on shore-side server</a:t>
             </a:r>
           </a:p>
           <a:p>
             <a:pPr algn="ctr"/>
             <a:r>
-              <a:rPr lang="en-US" sz="1100" dirty="0" smtClean="0"/>
+              <a:rPr lang="en-US" sz="1100" dirty="0"/>
               <a:t>Download zip archives of hourly files:  </a:t>
             </a:r>
             <a:r>
-              <a:rPr lang="en-US" sz="1100" dirty="0" smtClean="0">
+              <a:rPr lang="en-US" sz="1100" dirty="0">
                 <a:hlinkClick r:id="rId2"/>
               </a:rPr>
               <a:t>http://faculty.uw.edu/jmt3rd/SWIFTdata/DynamicDataLinks.html</a:t>
             </a:r>
             <a:r>
-              <a:rPr lang="en-US" sz="1100" dirty="0" smtClean="0"/>
+              <a:rPr lang="en-US" sz="1100" dirty="0"/>
               <a:t> </a:t>
             </a:r>
           </a:p>
           <a:p>
             <a:pPr algn="ctr"/>
             <a:r>
-              <a:rPr lang="en-US" sz="1100" dirty="0" smtClean="0"/>
+              <a:rPr lang="en-US" sz="1100" dirty="0"/>
               <a:t>Live map: </a:t>
             </a:r>
             <a:r>
-              <a:rPr lang="en-US" sz="1100" dirty="0" smtClean="0">
+              <a:rPr lang="en-US" sz="1100" dirty="0">
                 <a:hlinkClick r:id="rId3"/>
               </a:rPr>
               <a:t>http://swiftserver.apl.uw.edu/map</a:t>
             </a:r>
             <a:r>
-              <a:rPr lang="en-US" sz="1100" dirty="0" smtClean="0"/>
+              <a:rPr lang="en-US" sz="1100" dirty="0"/>
               <a:t> </a:t>
             </a:r>
           </a:p>
@@ -3924,16 +3900,15 @@
           <a:lstStyle/>
           <a:p>
             <a:r>
-              <a:rPr lang="en-US" sz="1200" dirty="0" smtClean="0"/>
+              <a:rPr lang="en-US" sz="1200" dirty="0"/>
               <a:t>data collection in bursts of 512 s at 720 s intervals</a:t>
             </a:r>
           </a:p>
           <a:p>
             <a:r>
-              <a:rPr lang="en-US" sz="1200" dirty="0" smtClean="0"/>
+              <a:rPr lang="en-US" sz="1200" dirty="0"/>
               <a:t>duty cycle configurable from 1 to 5 bursts per hour</a:t>
             </a:r>
-            <a:endParaRPr lang="en-US" sz="1200" dirty="0"/>
           </a:p>
         </p:txBody>
       </p:sp>
@@ -4007,21 +3982,20 @@
           <a:p>
             <a:pPr algn="ctr"/>
             <a:r>
-              <a:rPr lang="en-US" dirty="0" err="1" smtClean="0"/>
+              <a:rPr lang="en-US" dirty="0" err="1"/>
               <a:t>Matlab</a:t>
             </a:r>
             <a:r>
-              <a:rPr lang="en-US" dirty="0" smtClean="0"/>
+              <a:rPr lang="en-US" dirty="0"/>
               <a:t> structure of telemetry data and plots</a:t>
             </a:r>
           </a:p>
           <a:p>
             <a:pPr algn="ctr"/>
             <a:r>
-              <a:rPr lang="en-US" dirty="0" smtClean="0"/>
+              <a:rPr lang="en-US" dirty="0"/>
               <a:t>(local machine)</a:t>
             </a:r>
-            <a:endParaRPr lang="en-US" dirty="0"/>
           </a:p>
         </p:txBody>
       </p:sp>
@@ -4308,17 +4282,16 @@
           <a:p>
             <a:pPr algn="ctr"/>
             <a:r>
-              <a:rPr lang="en-US" sz="1000" dirty="0" smtClean="0"/>
+              <a:rPr lang="en-US" sz="1000" dirty="0"/>
               <a:t>serial</a:t>
             </a:r>
           </a:p>
           <a:p>
             <a:pPr algn="ctr"/>
             <a:r>
-              <a:rPr lang="en-US" sz="1000" dirty="0" smtClean="0"/>
+              <a:rPr lang="en-US" sz="1000" dirty="0"/>
               <a:t>25 Hz binary</a:t>
             </a:r>
-            <a:endParaRPr lang="en-US" sz="1000" dirty="0"/>
           </a:p>
         </p:txBody>
       </p:sp>
@@ -4346,7 +4319,7 @@
           <a:p>
             <a:pPr algn="ctr"/>
             <a:r>
-              <a:rPr lang="en-US" sz="1000" dirty="0" smtClean="0"/>
+              <a:rPr lang="en-US" sz="1000" dirty="0"/>
               <a:t>serial</a:t>
             </a:r>
           </a:p>
@@ -4354,13 +4327,8 @@
             <a:pPr algn="ctr"/>
             <a:r>
               <a:rPr lang="en-US" sz="1000" dirty="0"/>
-              <a:t>1</a:t>
-            </a:r>
-            <a:r>
-              <a:rPr lang="en-US" sz="1000" dirty="0" smtClean="0"/>
-              <a:t> Hz ASCII</a:t>
-            </a:r>
-            <a:endParaRPr lang="en-US" sz="1000" dirty="0"/>
+              <a:t>1 Hz ASCII</a:t>
+            </a:r>
           </a:p>
         </p:txBody>
       </p:sp>
@@ -4388,7 +4356,7 @@
           <a:p>
             <a:pPr algn="ctr"/>
             <a:r>
-              <a:rPr lang="en-US" sz="1000" dirty="0" smtClean="0"/>
+              <a:rPr lang="en-US" sz="1000" dirty="0"/>
               <a:t>serial</a:t>
             </a:r>
           </a:p>
@@ -4396,13 +4364,8 @@
             <a:pPr algn="ctr"/>
             <a:r>
               <a:rPr lang="en-US" sz="1000" dirty="0"/>
-              <a:t>1</a:t>
-            </a:r>
-            <a:r>
-              <a:rPr lang="en-US" sz="1000" dirty="0" smtClean="0"/>
-              <a:t> Hz ASCII</a:t>
-            </a:r>
-            <a:endParaRPr lang="en-US" sz="1000" dirty="0"/>
+              <a:t>1 Hz ASCII</a:t>
+            </a:r>
           </a:p>
         </p:txBody>
       </p:sp>
@@ -4430,7 +4393,7 @@
           <a:p>
             <a:pPr algn="ctr"/>
             <a:r>
-              <a:rPr lang="en-US" sz="1000" dirty="0" smtClean="0"/>
+              <a:rPr lang="en-US" sz="1000" dirty="0"/>
               <a:t>serial</a:t>
             </a:r>
           </a:p>
@@ -4438,13 +4401,8 @@
             <a:pPr algn="ctr"/>
             <a:r>
               <a:rPr lang="en-US" sz="1000" dirty="0"/>
-              <a:t>1</a:t>
-            </a:r>
-            <a:r>
-              <a:rPr lang="en-US" sz="1000" dirty="0" smtClean="0"/>
-              <a:t> Hz ASCII</a:t>
-            </a:r>
-            <a:endParaRPr lang="en-US" sz="1000" dirty="0"/>
+              <a:t>1 Hz ASCII</a:t>
+            </a:r>
           </a:p>
         </p:txBody>
       </p:sp>
@@ -4472,24 +4430,23 @@
           <a:p>
             <a:pPr algn="ctr"/>
             <a:r>
-              <a:rPr lang="en-US" sz="1000" dirty="0" smtClean="0"/>
+              <a:rPr lang="en-US" sz="1000" dirty="0"/>
               <a:t> 4 Hz NMEA</a:t>
             </a:r>
           </a:p>
           <a:p>
             <a:pPr algn="ctr"/>
             <a:r>
-              <a:rPr lang="en-US" sz="1000" dirty="0" smtClean="0"/>
+              <a:rPr lang="en-US" sz="1000" dirty="0"/>
               <a:t>or 1 Hz SDI-12</a:t>
             </a:r>
           </a:p>
           <a:p>
             <a:pPr algn="ctr"/>
             <a:r>
-              <a:rPr lang="en-US" sz="1000" dirty="0" smtClean="0"/>
+              <a:rPr lang="en-US" sz="1000" dirty="0"/>
               <a:t>or 10 Hz ASCII</a:t>
             </a:r>
-            <a:endParaRPr lang="en-US" sz="1000" dirty="0"/>
           </a:p>
         </p:txBody>
       </p:sp>
@@ -4517,17 +4474,16 @@
           <a:p>
             <a:pPr algn="ctr"/>
             <a:r>
-              <a:rPr lang="en-US" sz="1000" dirty="0" smtClean="0"/>
+              <a:rPr lang="en-US" sz="1000" dirty="0"/>
               <a:t>serial</a:t>
             </a:r>
           </a:p>
           <a:p>
             <a:pPr algn="ctr"/>
             <a:r>
-              <a:rPr lang="en-US" sz="1000" dirty="0" smtClean="0"/>
+              <a:rPr lang="en-US" sz="1000" dirty="0"/>
               <a:t>0.25 Hz jpg</a:t>
             </a:r>
-            <a:endParaRPr lang="en-US" sz="1000" dirty="0"/>
           </a:p>
         </p:txBody>
       </p:sp>
@@ -4779,29 +4735,28 @@
           <a:p>
             <a:pPr algn="ctr"/>
             <a:r>
-              <a:rPr lang="en-US" sz="1000" dirty="0" smtClean="0"/>
+              <a:rPr lang="en-US" sz="1000" dirty="0"/>
               <a:t>wave spectra</a:t>
             </a:r>
           </a:p>
           <a:p>
             <a:pPr algn="ctr"/>
             <a:r>
-              <a:rPr lang="en-US" sz="1000" dirty="0" smtClean="0"/>
+              <a:rPr lang="en-US" sz="1000" dirty="0"/>
               <a:t>directional </a:t>
             </a:r>
             <a:r>
-              <a:rPr lang="en-US" sz="1000" dirty="0" err="1" smtClean="0"/>
+              <a:rPr lang="en-US" sz="1000" dirty="0" err="1"/>
               <a:t>coefs</a:t>
             </a:r>
-            <a:endParaRPr lang="en-US" sz="1000" dirty="0" smtClean="0"/>
-          </a:p>
-          <a:p>
-            <a:pPr algn="ctr"/>
-            <a:r>
-              <a:rPr lang="en-US" sz="1000" dirty="0" smtClean="0"/>
+            <a:endParaRPr lang="en-US" sz="1000" dirty="0"/>
+          </a:p>
+          <a:p>
+            <a:pPr algn="ctr"/>
+            <a:r>
+              <a:rPr lang="en-US" sz="1000" dirty="0"/>
               <a:t>bulk parameters</a:t>
             </a:r>
-            <a:endParaRPr lang="en-US" sz="1000" dirty="0"/>
           </a:p>
         </p:txBody>
       </p:sp>
@@ -4829,21 +4784,20 @@
           <a:p>
             <a:pPr algn="ctr"/>
             <a:r>
-              <a:rPr lang="en-US" sz="1000" dirty="0" smtClean="0"/>
+              <a:rPr lang="en-US" sz="1000" dirty="0"/>
               <a:t>mean value</a:t>
             </a:r>
           </a:p>
           <a:p>
             <a:pPr algn="ctr"/>
             <a:r>
-              <a:rPr lang="en-US" sz="1000" dirty="0" err="1" smtClean="0"/>
+              <a:rPr lang="en-US" sz="1000" dirty="0" err="1"/>
               <a:t>std</a:t>
             </a:r>
             <a:r>
-              <a:rPr lang="en-US" sz="1000" dirty="0" smtClean="0"/>
+              <a:rPr lang="en-US" sz="1000" dirty="0"/>
               <a:t> deviation</a:t>
             </a:r>
-            <a:endParaRPr lang="en-US" sz="1000" dirty="0"/>
           </a:p>
         </p:txBody>
       </p:sp>
@@ -4871,21 +4825,20 @@
           <a:p>
             <a:pPr algn="ctr"/>
             <a:r>
-              <a:rPr lang="en-US" sz="1000" dirty="0" smtClean="0"/>
+              <a:rPr lang="en-US" sz="1000" dirty="0"/>
               <a:t>mean value</a:t>
             </a:r>
           </a:p>
           <a:p>
             <a:pPr algn="ctr"/>
             <a:r>
-              <a:rPr lang="en-US" sz="1000" dirty="0" err="1" smtClean="0"/>
+              <a:rPr lang="en-US" sz="1000" dirty="0" err="1"/>
               <a:t>std</a:t>
             </a:r>
             <a:r>
-              <a:rPr lang="en-US" sz="1000" dirty="0" smtClean="0"/>
+              <a:rPr lang="en-US" sz="1000" dirty="0"/>
               <a:t> deviation</a:t>
             </a:r>
-            <a:endParaRPr lang="en-US" sz="1000" dirty="0"/>
           </a:p>
         </p:txBody>
       </p:sp>
@@ -4913,21 +4866,20 @@
           <a:p>
             <a:pPr algn="ctr"/>
             <a:r>
-              <a:rPr lang="en-US" sz="1000" dirty="0" smtClean="0"/>
+              <a:rPr lang="en-US" sz="1000" dirty="0"/>
               <a:t>mean value</a:t>
             </a:r>
           </a:p>
           <a:p>
             <a:pPr algn="ctr"/>
             <a:r>
-              <a:rPr lang="en-US" sz="1000" dirty="0" err="1" smtClean="0"/>
+              <a:rPr lang="en-US" sz="1000" dirty="0" err="1"/>
               <a:t>std</a:t>
             </a:r>
             <a:r>
-              <a:rPr lang="en-US" sz="1000" dirty="0" smtClean="0"/>
+              <a:rPr lang="en-US" sz="1000" dirty="0"/>
               <a:t> deviation</a:t>
             </a:r>
-            <a:endParaRPr lang="en-US" sz="1000" dirty="0"/>
           </a:p>
         </p:txBody>
       </p:sp>
@@ -4955,42 +4907,41 @@
           <a:p>
             <a:pPr algn="ctr"/>
             <a:r>
-              <a:rPr lang="en-US" sz="1000" dirty="0" smtClean="0"/>
+              <a:rPr lang="en-US" sz="1000" dirty="0"/>
               <a:t>mean value</a:t>
             </a:r>
           </a:p>
           <a:p>
             <a:pPr algn="ctr"/>
             <a:r>
-              <a:rPr lang="en-US" sz="1000" dirty="0" err="1" smtClean="0"/>
+              <a:rPr lang="en-US" sz="1000" dirty="0" err="1"/>
               <a:t>std</a:t>
             </a:r>
             <a:r>
-              <a:rPr lang="en-US" sz="1000" dirty="0" smtClean="0"/>
+              <a:rPr lang="en-US" sz="1000" dirty="0"/>
               <a:t> deviation</a:t>
             </a:r>
           </a:p>
           <a:p>
             <a:pPr algn="ctr"/>
             <a:r>
-              <a:rPr lang="en-US" sz="1000" dirty="0" smtClean="0"/>
+              <a:rPr lang="en-US" sz="1000" dirty="0"/>
               <a:t>or </a:t>
             </a:r>
           </a:p>
           <a:p>
             <a:pPr algn="ctr"/>
             <a:r>
-              <a:rPr lang="en-US" sz="1000" dirty="0" smtClean="0"/>
+              <a:rPr lang="en-US" sz="1000" dirty="0"/>
               <a:t>inertial dissipation</a:t>
             </a:r>
           </a:p>
           <a:p>
             <a:pPr algn="ctr"/>
             <a:r>
-              <a:rPr lang="en-US" sz="1000" dirty="0" smtClean="0"/>
+              <a:rPr lang="en-US" sz="1000" dirty="0"/>
               <a:t>(3D sonic only)</a:t>
             </a:r>
-            <a:endParaRPr lang="en-US" sz="1000" dirty="0"/>
           </a:p>
         </p:txBody>
       </p:sp>
@@ -5018,10 +4969,9 @@
           <a:p>
             <a:pPr algn="ctr"/>
             <a:r>
-              <a:rPr lang="en-US" sz="1000" dirty="0" smtClean="0"/>
+              <a:rPr lang="en-US" sz="1000" dirty="0"/>
               <a:t>n/a</a:t>
             </a:r>
-            <a:endParaRPr lang="en-US" sz="1000" dirty="0"/>
           </a:p>
         </p:txBody>
       </p:sp>
@@ -5258,8 +5208,8 @@
         </p:nvSpPr>
         <p:spPr>
           <a:xfrm>
-            <a:off x="1168863" y="5597555"/>
-            <a:ext cx="4612648" cy="553998"/>
+            <a:off x="1188700" y="5743244"/>
+            <a:ext cx="4632999" cy="400110"/>
           </a:xfrm>
           <a:prstGeom prst="rect">
             <a:avLst/>
@@ -5274,25 +5224,16 @@
           <a:p>
             <a:pPr algn="ctr"/>
             <a:r>
-              <a:rPr lang="en-US" sz="1000" dirty="0" smtClean="0"/>
-              <a:t>first burst of each hour only: </a:t>
-            </a:r>
-          </a:p>
-          <a:p>
-            <a:pPr algn="ctr"/>
-            <a:r>
-              <a:rPr lang="en-US" sz="1000" dirty="0" smtClean="0"/>
+              <a:rPr lang="en-US" sz="1000" dirty="0"/>
               <a:t>combine processed results to single binary telemetry file for Iridium SBD transmission</a:t>
             </a:r>
-            <a:endParaRPr lang="en-US" sz="1000" dirty="0"/>
-          </a:p>
-          <a:p>
-            <a:pPr algn="ctr"/>
-            <a:r>
-              <a:rPr lang="en-US" sz="1000" dirty="0" smtClean="0"/>
+          </a:p>
+          <a:p>
+            <a:pPr algn="ctr"/>
+            <a:r>
+              <a:rPr lang="en-US" sz="1000" dirty="0"/>
               <a:t>**jpg from camera included once per day, at 2100 UTC only**</a:t>
             </a:r>
-            <a:endParaRPr lang="en-US" sz="1000" dirty="0"/>
           </a:p>
         </p:txBody>
       </p:sp>
@@ -5304,8 +5245,8 @@
         </p:nvSpPr>
         <p:spPr>
           <a:xfrm>
-            <a:off x="1092480" y="7480300"/>
-            <a:ext cx="4673074" cy="707886"/>
+            <a:off x="1082062" y="7480300"/>
+            <a:ext cx="4693913" cy="861774"/>
           </a:xfrm>
           <a:prstGeom prst="rect">
             <a:avLst/>
@@ -5320,15 +5261,55 @@
           <a:p>
             <a:pPr algn="ctr"/>
             <a:r>
-              <a:rPr lang="en-US" sz="1000" dirty="0" err="1" smtClean="0"/>
+              <a:rPr lang="en-US" sz="1000" dirty="0" err="1"/>
               <a:t>Matlab</a:t>
             </a:r>
             <a:r>
-              <a:rPr lang="en-US" sz="1000" dirty="0" smtClean="0"/>
-              <a:t> script </a:t>
-            </a:r>
-            <a:r>
-              <a:rPr lang="en-US" sz="1000" dirty="0" err="1" smtClean="0">
+              <a:rPr lang="en-US" sz="1000" dirty="0"/>
+              <a:t> function </a:t>
+            </a:r>
+            <a:r>
+              <a:rPr lang="en-US" sz="1000" dirty="0" err="1">
+                <a:solidFill>
+                  <a:srgbClr val="FF0000"/>
+                </a:solidFill>
+                <a:latin typeface="American Typewriter"/>
+              </a:rPr>
+              <a:t>pullSWIFTtelemetry</a:t>
+            </a:r>
+            <a:r>
+              <a:rPr lang="en-US" sz="1000" dirty="0" err="1">
+                <a:solidFill>
+                  <a:srgbClr val="FF0000"/>
+                </a:solidFill>
+                <a:latin typeface="American Typewriter"/>
+                <a:cs typeface="American Typewriter"/>
+              </a:rPr>
+              <a:t>.m</a:t>
+            </a:r>
+            <a:r>
+              <a:rPr lang="en-US" sz="1000" dirty="0">
+                <a:solidFill>
+                  <a:srgbClr val="FF0000"/>
+                </a:solidFill>
+                <a:latin typeface="American Typewriter"/>
+                <a:cs typeface="American Typewriter"/>
+              </a:rPr>
+              <a:t> </a:t>
+            </a:r>
+            <a:r>
+              <a:rPr lang="en-US" sz="1000" dirty="0"/>
+              <a:t>queries shoreside server for telemetry files</a:t>
+            </a:r>
+          </a:p>
+          <a:p>
+            <a:pPr algn="ctr"/>
+            <a:r>
+              <a:rPr lang="en-US" sz="1000" dirty="0"/>
+              <a:t>and then runs script </a:t>
+            </a:r>
+            <a:r>
+              <a:rPr lang="en-US" sz="1000" dirty="0" err="1">
                 <a:solidFill>
                   <a:srgbClr val="FF0000"/>
                 </a:solidFill>
@@ -5337,7 +5318,7 @@
               </a:rPr>
               <a:t>compileSWIFT_SBDservertelemetry.m</a:t>
             </a:r>
-            <a:endParaRPr lang="en-US" sz="1000" dirty="0" smtClean="0">
+            <a:endParaRPr lang="en-US" sz="1000" dirty="0">
               <a:solidFill>
                 <a:srgbClr val="FF0000"/>
               </a:solidFill>
@@ -5348,7 +5329,7 @@
           <a:p>
             <a:pPr algn="ctr"/>
             <a:r>
-              <a:rPr lang="en-US" sz="1000" dirty="0" smtClean="0">
+              <a:rPr lang="en-US" sz="1000" dirty="0">
                 <a:cs typeface="American Typewriter"/>
               </a:rPr>
               <a:t>which loops thru all the SBD files in the downloaded archive  (as the working directory)</a:t>
@@ -5357,13 +5338,13 @@
           <a:p>
             <a:pPr algn="ctr"/>
             <a:r>
-              <a:rPr lang="en-US" sz="1000" dirty="0" smtClean="0">
+              <a:rPr lang="en-US" sz="1000" dirty="0">
                 <a:cs typeface="American Typewriter"/>
               </a:rPr>
               <a:t>and reads individual binary files using the function </a:t>
             </a:r>
             <a:r>
-              <a:rPr lang="en-US" sz="1000" dirty="0" err="1" smtClean="0">
+              <a:rPr lang="en-US" sz="1000" dirty="0" err="1">
                 <a:solidFill>
                   <a:srgbClr val="FF0000"/>
                 </a:solidFill>
@@ -5372,7 +5353,7 @@
               </a:rPr>
               <a:t>readSWIFT_SBD.m</a:t>
             </a:r>
-            <a:endParaRPr lang="en-US" sz="1000" dirty="0" smtClean="0">
+            <a:endParaRPr lang="en-US" sz="1000" dirty="0">
               <a:solidFill>
                 <a:srgbClr val="FF0000"/>
               </a:solidFill>
@@ -5383,13 +5364,13 @@
           <a:p>
             <a:pPr algn="ctr"/>
             <a:r>
-              <a:rPr lang="en-US" sz="1000" dirty="0" smtClean="0">
+              <a:rPr lang="en-US" sz="1000" dirty="0">
                 <a:cs typeface="American Typewriter"/>
               </a:rPr>
               <a:t>then plots the whole dataset using the function </a:t>
             </a:r>
             <a:r>
-              <a:rPr lang="en-US" sz="1000" dirty="0" err="1" smtClean="0">
+              <a:rPr lang="en-US" sz="1000" dirty="0" err="1">
                 <a:solidFill>
                   <a:srgbClr val="FF0000"/>
                 </a:solidFill>
@@ -5461,18 +5442,17 @@
           <a:p>
             <a:pPr algn="ctr"/>
             <a:r>
-              <a:rPr lang="en-US" sz="2800" u="sng" dirty="0" smtClean="0"/>
+              <a:rPr lang="en-US" sz="2800" u="sng" dirty="0"/>
               <a:t>SWIFT </a:t>
             </a:r>
             <a:r>
-              <a:rPr lang="en-US" sz="2800" b="1" i="1" u="sng" dirty="0" smtClean="0"/>
+              <a:rPr lang="en-US" sz="2800" b="1" i="1" u="sng" dirty="0"/>
               <a:t>post-processing </a:t>
             </a:r>
             <a:r>
-              <a:rPr lang="en-US" sz="2800" u="sng" dirty="0" smtClean="0"/>
+              <a:rPr lang="en-US" sz="2800" u="sng" dirty="0"/>
               <a:t>data flow</a:t>
             </a:r>
-            <a:endParaRPr lang="en-US" sz="2800" u="sng" dirty="0"/>
           </a:p>
         </p:txBody>
       </p:sp>
@@ -5505,7 +5485,7 @@
           <a:p>
             <a:pPr algn="ctr"/>
             <a:r>
-              <a:rPr lang="en-US" dirty="0" smtClean="0"/>
+              <a:rPr lang="en-US" dirty="0"/>
               <a:t>processed files onboard SWIFT </a:t>
             </a:r>
           </a:p>
@@ -5516,22 +5496,21 @@
               <a:t>(</a:t>
             </a:r>
             <a:r>
-              <a:rPr lang="en-US" dirty="0" err="1" smtClean="0"/>
+              <a:rPr lang="en-US" dirty="0" err="1"/>
               <a:t>Sutron</a:t>
             </a:r>
             <a:r>
-              <a:rPr lang="en-US" dirty="0" smtClean="0"/>
+              <a:rPr lang="en-US" dirty="0"/>
               <a:t> </a:t>
             </a:r>
             <a:r>
-              <a:rPr lang="en-US" dirty="0" err="1" smtClean="0"/>
+              <a:rPr lang="en-US" dirty="0" err="1"/>
               <a:t>Xpert</a:t>
             </a:r>
             <a:r>
-              <a:rPr lang="en-US" dirty="0" smtClean="0"/>
+              <a:rPr lang="en-US" dirty="0"/>
               <a:t> SD card, directories by com port)</a:t>
             </a:r>
-            <a:endParaRPr lang="en-US" dirty="0"/>
           </a:p>
         </p:txBody>
       </p:sp>
@@ -5595,16 +5574,15 @@
           <a:lstStyle/>
           <a:p>
             <a:r>
-              <a:rPr lang="en-US" sz="1200" dirty="0" smtClean="0"/>
+              <a:rPr lang="en-US" sz="1200" dirty="0"/>
               <a:t>data collection in bursts of 512 s at 720 s intervals</a:t>
             </a:r>
           </a:p>
           <a:p>
             <a:r>
-              <a:rPr lang="en-US" sz="1200" dirty="0" smtClean="0"/>
+              <a:rPr lang="en-US" sz="1200" dirty="0"/>
               <a:t>duty cycle configurable from 1 to 5 bursts per hour</a:t>
             </a:r>
-            <a:endParaRPr lang="en-US" sz="1200" dirty="0"/>
           </a:p>
         </p:txBody>
       </p:sp>
@@ -5618,7 +5596,7 @@
         </p:nvCxnSpPr>
         <p:spPr>
           <a:xfrm>
-            <a:off x="3321658" y="5240417"/>
+            <a:off x="3323907" y="5176519"/>
             <a:ext cx="153528" cy="1249283"/>
           </a:xfrm>
           <a:prstGeom prst="straightConnector1">
@@ -5657,7 +5635,7 @@
         </p:nvSpPr>
         <p:spPr>
           <a:xfrm>
-            <a:off x="1052860" y="6489700"/>
+            <a:off x="1055109" y="6425802"/>
             <a:ext cx="4844651" cy="646331"/>
           </a:xfrm>
           <a:prstGeom prst="rect">
@@ -5678,21 +5656,20 @@
           <a:p>
             <a:pPr algn="ctr"/>
             <a:r>
-              <a:rPr lang="en-US" dirty="0" err="1" smtClean="0"/>
+              <a:rPr lang="en-US" dirty="0" err="1"/>
               <a:t>Matlab</a:t>
             </a:r>
             <a:r>
-              <a:rPr lang="en-US" dirty="0" smtClean="0"/>
+              <a:rPr lang="en-US" dirty="0"/>
               <a:t> structure of all processed data and plots</a:t>
             </a:r>
           </a:p>
           <a:p>
             <a:pPr algn="ctr"/>
             <a:r>
-              <a:rPr lang="en-US" dirty="0" smtClean="0"/>
+              <a:rPr lang="en-US" dirty="0"/>
               <a:t>(local machine)</a:t>
             </a:r>
-            <a:endParaRPr lang="en-US" dirty="0"/>
           </a:p>
         </p:txBody>
       </p:sp>
@@ -6417,8 +6394,8 @@
         </p:nvSpPr>
         <p:spPr>
           <a:xfrm>
-            <a:off x="850021" y="8511397"/>
-            <a:ext cx="3970721" cy="461665"/>
+            <a:off x="835044" y="8528374"/>
+            <a:ext cx="3970721" cy="646331"/>
           </a:xfrm>
           <a:prstGeom prst="rect">
             <a:avLst/>
@@ -6436,14 +6413,20 @@
           <a:lstStyle/>
           <a:p>
             <a:r>
-              <a:rPr lang="en-US" sz="1200" dirty="0" smtClean="0"/>
+              <a:rPr lang="en-US" sz="1200" dirty="0"/>
               <a:t>improved and phase-resolved dissipation rate profiles (AQH)</a:t>
             </a:r>
           </a:p>
           <a:p>
             <a:r>
-              <a:rPr lang="en-US" sz="1200" dirty="0" smtClean="0"/>
+              <a:rPr lang="en-US" sz="1200" dirty="0"/>
               <a:t>directional profiles (AQD)</a:t>
+            </a:r>
+          </a:p>
+          <a:p>
+            <a:r>
+              <a:rPr lang="en-US" sz="1200" dirty="0"/>
+              <a:t>Altimeter results, AHRS data (SIG)</a:t>
             </a:r>
           </a:p>
         </p:txBody>
@@ -6742,7 +6725,7 @@
         </p:nvSpPr>
         <p:spPr>
           <a:xfrm>
-            <a:off x="1588976" y="7590532"/>
+            <a:off x="1588976" y="7511022"/>
             <a:ext cx="2590297" cy="461665"/>
           </a:xfrm>
           <a:prstGeom prst="rect">
@@ -6762,16 +6745,15 @@
           <a:lstStyle/>
           <a:p>
             <a:r>
-              <a:rPr lang="en-US" sz="1200" dirty="0" smtClean="0"/>
+              <a:rPr lang="en-US" sz="1200" dirty="0"/>
               <a:t>raw wave displacements</a:t>
             </a:r>
           </a:p>
           <a:p>
             <a:r>
-              <a:rPr lang="en-US" sz="1200" dirty="0" smtClean="0"/>
+              <a:rPr lang="en-US" sz="1200" dirty="0"/>
               <a:t>improved wave spectra (no slope bias)</a:t>
             </a:r>
-            <a:endParaRPr lang="en-US" sz="1200" dirty="0"/>
           </a:p>
         </p:txBody>
       </p:sp>
@@ -6783,7 +6765,7 @@
         </p:nvSpPr>
         <p:spPr>
           <a:xfrm>
-            <a:off x="197570" y="7218045"/>
+            <a:off x="197570" y="7138535"/>
             <a:ext cx="5431352" cy="400110"/>
           </a:xfrm>
           <a:prstGeom prst="rect">
@@ -6797,7 +6779,7 @@
           <a:lstStyle/>
           <a:p>
             <a:r>
-              <a:rPr lang="en-US" sz="1000" dirty="0" err="1" smtClean="0">
+              <a:rPr lang="en-US" sz="1000" dirty="0" err="1">
                 <a:solidFill>
                   <a:srgbClr val="FF0000"/>
                 </a:solidFill>
@@ -6806,52 +6788,6 @@
               </a:rPr>
               <a:t>reprocess_IMU.m</a:t>
             </a:r>
-            <a:r>
-              <a:rPr lang="en-US" sz="1000" dirty="0" smtClean="0">
-                <a:solidFill>
-                  <a:srgbClr val="FF0000"/>
-                </a:solidFill>
-                <a:latin typeface="American Typewriter"/>
-                <a:cs typeface="American Typewriter"/>
-              </a:rPr>
-              <a:t> </a:t>
-            </a:r>
-            <a:r>
-              <a:rPr lang="en-US" sz="1000" dirty="0" smtClean="0">
-                <a:latin typeface="American Typewriter"/>
-                <a:cs typeface="American Typewriter"/>
-              </a:rPr>
-              <a:t>or </a:t>
-            </a:r>
-            <a:r>
-              <a:rPr lang="en-US" sz="1000" dirty="0" err="1" smtClean="0">
-                <a:solidFill>
-                  <a:srgbClr val="FF0000"/>
-                </a:solidFill>
-                <a:latin typeface="American Typewriter"/>
-                <a:cs typeface="American Typewriter"/>
-              </a:rPr>
-              <a:t>reprocess_SBG.m</a:t>
-            </a:r>
-            <a:r>
-              <a:rPr lang="en-US" sz="1000" dirty="0" smtClean="0">
-                <a:solidFill>
-                  <a:srgbClr val="FF0000"/>
-                </a:solidFill>
-                <a:latin typeface="American Typewriter"/>
-                <a:cs typeface="American Typewriter"/>
-              </a:rPr>
-              <a:t>, </a:t>
-            </a:r>
-            <a:endParaRPr lang="en-US" sz="1000" dirty="0" smtClean="0">
-              <a:solidFill>
-                <a:srgbClr val="FF0000"/>
-              </a:solidFill>
-              <a:latin typeface="American Typewriter"/>
-              <a:cs typeface="American Typewriter"/>
-            </a:endParaRPr>
-          </a:p>
-          <a:p>
             <a:r>
               <a:rPr lang="en-US" sz="1000" dirty="0">
                 <a:solidFill>
@@ -6863,20 +6799,65 @@
               <a:t> </a:t>
             </a:r>
             <a:r>
-              <a:rPr lang="en-US" sz="1000" dirty="0" smtClean="0">
+              <a:rPr lang="en-US" sz="1000" dirty="0">
+                <a:latin typeface="American Typewriter"/>
+                <a:cs typeface="American Typewriter"/>
+              </a:rPr>
+              <a:t>or </a:t>
+            </a:r>
+            <a:r>
+              <a:rPr lang="en-US" sz="1000" dirty="0" err="1">
                 <a:solidFill>
                   <a:srgbClr val="FF0000"/>
                 </a:solidFill>
                 <a:latin typeface="American Typewriter"/>
                 <a:cs typeface="American Typewriter"/>
               </a:rPr>
-              <a:t>   </a:t>
-            </a:r>
-            <a:r>
-              <a:rPr lang="en-US" sz="1000" dirty="0" smtClean="0">
+              <a:t>reprocess_SBG.m</a:t>
+            </a:r>
+            <a:r>
+              <a:rPr lang="en-US" sz="1000" dirty="0">
+                <a:solidFill>
+                  <a:srgbClr val="FF0000"/>
+                </a:solidFill>
+                <a:latin typeface="American Typewriter"/>
+                <a:cs typeface="American Typewriter"/>
+              </a:rPr>
+              <a:t>, </a:t>
+            </a:r>
+          </a:p>
+          <a:p>
+            <a:r>
+              <a:rPr lang="en-US" sz="1000" dirty="0">
+                <a:solidFill>
+                  <a:srgbClr val="FF0000"/>
+                </a:solidFill>
+                <a:latin typeface="American Typewriter"/>
+                <a:cs typeface="American Typewriter"/>
+              </a:rPr>
+              <a:t>    </a:t>
+            </a:r>
+            <a:r>
+              <a:rPr lang="en-US" sz="1000" dirty="0">
                 <a:cs typeface="American Typewriter"/>
               </a:rPr>
               <a:t>which calls</a:t>
+            </a:r>
+            <a:r>
+              <a:rPr lang="en-US" sz="1000" dirty="0">
+                <a:solidFill>
+                  <a:srgbClr val="FF0000"/>
+                </a:solidFill>
+                <a:latin typeface="American Typewriter"/>
+                <a:cs typeface="American Typewriter"/>
+              </a:rPr>
+              <a:t> readSWIFTv3_IMU.m </a:t>
+            </a:r>
+            <a:r>
+              <a:rPr lang="en-US" sz="1000" dirty="0">
+                <a:cs typeface="American Typewriter"/>
+              </a:rPr>
+              <a:t>and</a:t>
             </a:r>
             <a:r>
               <a:rPr lang="en-US" sz="1000" dirty="0">
@@ -6889,23 +6870,17 @@
               <a:t> </a:t>
             </a:r>
             <a:r>
-              <a:rPr lang="en-US" sz="1000" dirty="0" smtClean="0">
+              <a:rPr lang="en-US" sz="1000" dirty="0" err="1">
                 <a:solidFill>
                   <a:srgbClr val="FF0000"/>
                 </a:solidFill>
                 <a:latin typeface="American Typewriter"/>
                 <a:cs typeface="American Typewriter"/>
               </a:rPr>
-              <a:t>readSWIFTv3_IMU.m </a:t>
-            </a:r>
-            <a:r>
-              <a:rPr lang="en-US" sz="1000" dirty="0" smtClean="0">
-                <a:cs typeface="American Typewriter"/>
-              </a:rPr>
-              <a:t>and</a:t>
-            </a:r>
-            <a:r>
-              <a:rPr lang="en-US" sz="1000" dirty="0" smtClean="0">
+              <a:t>rawdisplacements.m</a:t>
+            </a:r>
+            <a:r>
+              <a:rPr lang="en-US" sz="1000" dirty="0">
                 <a:solidFill>
                   <a:srgbClr val="FF0000"/>
                 </a:solidFill>
@@ -6915,17 +6890,14 @@
               <a:t> </a:t>
             </a:r>
             <a:r>
-              <a:rPr lang="en-US" sz="1000" dirty="0" err="1" smtClean="0">
-                <a:solidFill>
-                  <a:srgbClr val="FF0000"/>
-                </a:solidFill>
+              <a:rPr lang="en-US" sz="1000" dirty="0">
                 <a:latin typeface="American Typewriter"/>
                 <a:cs typeface="American Typewriter"/>
               </a:rPr>
-              <a:t>rawdisplacements.m</a:t>
-            </a:r>
-            <a:r>
-              <a:rPr lang="en-US" sz="1000" dirty="0" smtClean="0">
+              <a:t>and</a:t>
+            </a:r>
+            <a:r>
+              <a:rPr lang="en-US" sz="1000" dirty="0">
                 <a:solidFill>
                   <a:srgbClr val="FF0000"/>
                 </a:solidFill>
@@ -6935,14 +6907,93 @@
               <a:t> </a:t>
             </a:r>
             <a:r>
-              <a:rPr lang="en-US" sz="1000" dirty="0" smtClean="0">
+              <a:rPr lang="en-US" sz="1000" dirty="0" err="1">
+                <a:solidFill>
+                  <a:srgbClr val="FF0000"/>
+                </a:solidFill>
                 <a:latin typeface="American Typewriter"/>
                 <a:cs typeface="American Typewriter"/>
               </a:rPr>
-              <a:t>and</a:t>
-            </a:r>
-            <a:r>
-              <a:rPr lang="en-US" sz="1000" dirty="0" smtClean="0">
+              <a:t>XYZwaves.m</a:t>
+            </a:r>
+            <a:endParaRPr lang="en-US" sz="1000" dirty="0">
+              <a:solidFill>
+                <a:srgbClr val="FF0000"/>
+              </a:solidFill>
+              <a:latin typeface="American Typewriter"/>
+              <a:cs typeface="American Typewriter"/>
+            </a:endParaRPr>
+          </a:p>
+        </p:txBody>
+      </p:sp>
+      <p:sp>
+        <p:nvSpPr>
+          <p:cNvPr id="80" name="Rectangle 79"/>
+          <p:cNvSpPr/>
+          <p:nvPr/>
+        </p:nvSpPr>
+        <p:spPr>
+          <a:xfrm>
+            <a:off x="22667" y="7983436"/>
+            <a:ext cx="5975646" cy="861774"/>
+          </a:xfrm>
+          <a:prstGeom prst="rect">
+            <a:avLst/>
+          </a:prstGeom>
+        </p:spPr>
+        <p:txBody>
+          <a:bodyPr wrap="square">
+            <a:spAutoFit/>
+          </a:bodyPr>
+          <a:lstStyle/>
+          <a:p>
+            <a:r>
+              <a:rPr lang="en-US" sz="1000" dirty="0" err="1">
+                <a:solidFill>
+                  <a:srgbClr val="FF0000"/>
+                </a:solidFill>
+                <a:latin typeface="American Typewriter"/>
+                <a:cs typeface="American Typewriter"/>
+              </a:rPr>
+              <a:t>reprocess_AQH.m</a:t>
+            </a:r>
+            <a:r>
+              <a:rPr lang="en-US" sz="1000" dirty="0">
+                <a:solidFill>
+                  <a:srgbClr val="FF0000"/>
+                </a:solidFill>
+                <a:latin typeface="American Typewriter"/>
+                <a:cs typeface="American Typewriter"/>
+              </a:rPr>
+              <a:t>  </a:t>
+            </a:r>
+            <a:r>
+              <a:rPr lang="en-US" sz="1000" dirty="0">
+                <a:cs typeface="American Typewriter"/>
+              </a:rPr>
+              <a:t>which calls </a:t>
+            </a:r>
+            <a:r>
+              <a:rPr lang="en-US" sz="1000" dirty="0">
+                <a:solidFill>
+                  <a:srgbClr val="FF0000"/>
+                </a:solidFill>
+                <a:latin typeface="American Typewriter"/>
+                <a:cs typeface="American Typewriter"/>
+              </a:rPr>
+              <a:t>readSWIFTv3_AQH.m</a:t>
+            </a:r>
+            <a:r>
+              <a:rPr lang="en-US" sz="1000" dirty="0">
+                <a:solidFill>
+                  <a:srgbClr val="000000"/>
+                </a:solidFill>
+                <a:cs typeface="American Typewriter"/>
+              </a:rPr>
+              <a:t>,</a:t>
+            </a:r>
+            <a:r>
+              <a:rPr lang="en-US" sz="1000" dirty="0">
                 <a:solidFill>
                   <a:srgbClr val="FF0000"/>
                 </a:solidFill>
@@ -6952,93 +7003,17 @@
               <a:t> </a:t>
             </a:r>
             <a:r>
-              <a:rPr lang="en-US" sz="1000" dirty="0" err="1" smtClean="0">
+              <a:rPr lang="en-US" sz="1000" dirty="0" err="1">
                 <a:solidFill>
                   <a:srgbClr val="FF0000"/>
                 </a:solidFill>
                 <a:latin typeface="American Typewriter"/>
                 <a:cs typeface="American Typewriter"/>
               </a:rPr>
-              <a:t>XYZwaves.m</a:t>
-            </a:r>
-            <a:endParaRPr lang="en-US" sz="1000" dirty="0" smtClean="0">
-              <a:solidFill>
-                <a:srgbClr val="FF0000"/>
-              </a:solidFill>
-              <a:latin typeface="American Typewriter"/>
-              <a:cs typeface="American Typewriter"/>
-            </a:endParaRPr>
-          </a:p>
-        </p:txBody>
-      </p:sp>
-      <p:sp>
-        <p:nvSpPr>
-          <p:cNvPr id="80" name="Rectangle 79"/>
-          <p:cNvSpPr/>
-          <p:nvPr/>
-        </p:nvSpPr>
-        <p:spPr>
-          <a:xfrm>
-            <a:off x="33838" y="8132800"/>
-            <a:ext cx="5975646" cy="553998"/>
-          </a:xfrm>
-          <a:prstGeom prst="rect">
-            <a:avLst/>
-          </a:prstGeom>
-        </p:spPr>
-        <p:txBody>
-          <a:bodyPr wrap="square">
-            <a:spAutoFit/>
-          </a:bodyPr>
-          <a:lstStyle/>
-          <a:p>
-            <a:r>
-              <a:rPr lang="en-US" sz="1000" dirty="0" err="1" smtClean="0">
-                <a:solidFill>
-                  <a:srgbClr val="FF0000"/>
-                </a:solidFill>
-                <a:latin typeface="American Typewriter"/>
-                <a:cs typeface="American Typewriter"/>
-              </a:rPr>
-              <a:t>reprocess_AQH.m</a:t>
-            </a:r>
-            <a:r>
-              <a:rPr lang="en-US" sz="1000" dirty="0" smtClean="0">
-                <a:solidFill>
-                  <a:srgbClr val="FF0000"/>
-                </a:solidFill>
-                <a:latin typeface="American Typewriter"/>
-                <a:cs typeface="American Typewriter"/>
-              </a:rPr>
-              <a:t>  </a:t>
-            </a:r>
-            <a:r>
-              <a:rPr lang="en-US" sz="1000" dirty="0" smtClean="0">
-                <a:cs typeface="American Typewriter"/>
-              </a:rPr>
-              <a:t>which calls </a:t>
-            </a:r>
-            <a:r>
-              <a:rPr lang="en-US" sz="1000" dirty="0" smtClean="0">
-                <a:solidFill>
-                  <a:srgbClr val="FF0000"/>
-                </a:solidFill>
-                <a:latin typeface="American Typewriter"/>
-                <a:cs typeface="American Typewriter"/>
-              </a:rPr>
-              <a:t>readSWIFTv3_AQH.m</a:t>
-            </a:r>
-            <a:r>
-              <a:rPr lang="en-US" sz="1000" dirty="0" smtClean="0">
-                <a:solidFill>
-                  <a:srgbClr val="000000"/>
-                </a:solidFill>
-                <a:cs typeface="American Typewriter"/>
-              </a:rPr>
-              <a:t>,</a:t>
-            </a:r>
-            <a:r>
-              <a:rPr lang="en-US" sz="1000" dirty="0" smtClean="0">
+              <a:t>dissipation.m</a:t>
+            </a:r>
+            <a:r>
+              <a:rPr lang="en-US" sz="1000" dirty="0">
                 <a:solidFill>
                   <a:srgbClr val="FF0000"/>
                 </a:solidFill>
@@ -7048,7 +7023,128 @@
               <a:t> </a:t>
             </a:r>
             <a:r>
-              <a:rPr lang="en-US" sz="1000" dirty="0" err="1" smtClean="0">
+              <a:rPr lang="en-US" sz="1000" dirty="0">
+                <a:solidFill>
+                  <a:srgbClr val="000000"/>
+                </a:solidFill>
+                <a:cs typeface="American Typewriter"/>
+              </a:rPr>
+              <a:t>and </a:t>
+            </a:r>
+            <a:r>
+              <a:rPr lang="en-US" sz="1000" dirty="0" err="1">
+                <a:solidFill>
+                  <a:srgbClr val="FF0000"/>
+                </a:solidFill>
+                <a:latin typeface="American Typewriter"/>
+                <a:cs typeface="American Typewriter"/>
+              </a:rPr>
+              <a:t>structurefunction.m</a:t>
+            </a:r>
+            <a:endParaRPr lang="en-US" sz="1000" dirty="0">
+              <a:solidFill>
+                <a:srgbClr val="FF0000"/>
+              </a:solidFill>
+              <a:latin typeface="American Typewriter"/>
+              <a:cs typeface="American Typewriter"/>
+            </a:endParaRPr>
+          </a:p>
+          <a:p>
+            <a:r>
+              <a:rPr lang="en-US" sz="1000" dirty="0" err="1">
+                <a:solidFill>
+                  <a:srgbClr val="FF0000"/>
+                </a:solidFill>
+                <a:latin typeface="American Typewriter"/>
+                <a:cs typeface="American Typewriter"/>
+              </a:rPr>
+              <a:t>reprocess_AQD.m</a:t>
+            </a:r>
+            <a:r>
+              <a:rPr lang="en-US" sz="1000" dirty="0">
+                <a:solidFill>
+                  <a:srgbClr val="FF0000"/>
+                </a:solidFill>
+                <a:latin typeface="American Typewriter"/>
+                <a:cs typeface="American Typewriter"/>
+              </a:rPr>
+              <a:t>, </a:t>
+            </a:r>
+            <a:r>
+              <a:rPr lang="en-US" sz="1000" dirty="0">
+                <a:cs typeface="American Typewriter"/>
+              </a:rPr>
+              <a:t>which calls </a:t>
+            </a:r>
+            <a:r>
+              <a:rPr lang="en-US" sz="1000" dirty="0">
+                <a:solidFill>
+                  <a:srgbClr val="FF0000"/>
+                </a:solidFill>
+                <a:latin typeface="American Typewriter"/>
+                <a:cs typeface="American Typewriter"/>
+              </a:rPr>
+              <a:t>readSWIFTv3_AQD.m</a:t>
+            </a:r>
+          </a:p>
+          <a:p>
+            <a:r>
+              <a:rPr lang="en-US" sz="1000" dirty="0" err="1">
+                <a:solidFill>
+                  <a:srgbClr val="FF0000"/>
+                </a:solidFill>
+                <a:latin typeface="American Typewriter"/>
+                <a:cs typeface="American Typewriter"/>
+              </a:rPr>
+              <a:t>Reprocess_SIG.m</a:t>
+            </a:r>
+            <a:r>
+              <a:rPr lang="en-US" sz="1000" dirty="0">
+                <a:solidFill>
+                  <a:srgbClr val="FF0000"/>
+                </a:solidFill>
+                <a:latin typeface="American Typewriter"/>
+                <a:cs typeface="American Typewriter"/>
+              </a:rPr>
+              <a:t>, </a:t>
+            </a:r>
+            <a:r>
+              <a:rPr lang="en-US" sz="1000" dirty="0">
+                <a:cs typeface="American Typewriter"/>
+              </a:rPr>
+              <a:t>which calls </a:t>
+            </a:r>
+            <a:r>
+              <a:rPr lang="en-US" sz="1000" dirty="0">
+                <a:solidFill>
+                  <a:srgbClr val="FF0000"/>
+                </a:solidFill>
+                <a:latin typeface="American Typewriter"/>
+                <a:cs typeface="American Typewriter"/>
+              </a:rPr>
+              <a:t>readSWIFTv4_SIG.m</a:t>
+            </a:r>
+            <a:r>
+              <a:rPr lang="en-US" sz="1000" dirty="0">
+                <a:solidFill>
+                  <a:srgbClr val="000000"/>
+                </a:solidFill>
+                <a:cs typeface="American Typewriter"/>
+              </a:rPr>
+              <a:t>,</a:t>
+            </a:r>
+            <a:r>
+              <a:rPr lang="en-US" sz="1000" dirty="0">
+                <a:solidFill>
+                  <a:srgbClr val="FF0000"/>
+                </a:solidFill>
+                <a:latin typeface="American Typewriter"/>
+                <a:cs typeface="American Typewriter"/>
+              </a:rPr>
+              <a:t> </a:t>
+            </a:r>
+            <a:r>
+              <a:rPr lang="en-US" sz="1000" dirty="0" err="1">
                 <a:solidFill>
                   <a:srgbClr val="FF0000"/>
                 </a:solidFill>
@@ -7058,7 +7154,7 @@
               <a:t>dissipation.m</a:t>
             </a:r>
             <a:r>
-              <a:rPr lang="en-US" sz="1000" dirty="0" smtClean="0">
+              <a:rPr lang="en-US" sz="1000" dirty="0">
                 <a:solidFill>
                   <a:srgbClr val="FF0000"/>
                 </a:solidFill>
@@ -7068,7 +7164,7 @@
               <a:t> </a:t>
             </a:r>
             <a:r>
-              <a:rPr lang="en-US" sz="1000" dirty="0" smtClean="0">
+              <a:rPr lang="en-US" sz="1000" dirty="0">
                 <a:solidFill>
                   <a:srgbClr val="000000"/>
                 </a:solidFill>
@@ -7077,7 +7173,7 @@
               <a:t>and </a:t>
             </a:r>
             <a:r>
-              <a:rPr lang="en-US" sz="1000" dirty="0" err="1" smtClean="0">
+              <a:rPr lang="en-US" sz="1000" dirty="0" err="1">
                 <a:solidFill>
                   <a:srgbClr val="FF0000"/>
                 </a:solidFill>
@@ -7086,57 +7182,6 @@
               </a:rPr>
               <a:t>structurefunction.m</a:t>
             </a:r>
-            <a:endParaRPr lang="en-US" sz="1000" dirty="0" smtClean="0">
-              <a:solidFill>
-                <a:srgbClr val="FF0000"/>
-              </a:solidFill>
-              <a:latin typeface="American Typewriter"/>
-              <a:cs typeface="American Typewriter"/>
-            </a:endParaRPr>
-          </a:p>
-          <a:p>
-            <a:r>
-              <a:rPr lang="en-US" sz="1000" dirty="0" err="1" smtClean="0">
-                <a:solidFill>
-                  <a:srgbClr val="FF0000"/>
-                </a:solidFill>
-                <a:latin typeface="American Typewriter"/>
-                <a:cs typeface="American Typewriter"/>
-              </a:rPr>
-              <a:t>reprocess_AQD.m</a:t>
-            </a:r>
-            <a:r>
-              <a:rPr lang="en-US" sz="1000" dirty="0" smtClean="0">
-                <a:solidFill>
-                  <a:srgbClr val="FF0000"/>
-                </a:solidFill>
-                <a:latin typeface="American Typewriter"/>
-                <a:cs typeface="American Typewriter"/>
-              </a:rPr>
-              <a:t>, </a:t>
-            </a:r>
-            <a:r>
-              <a:rPr lang="en-US" sz="1000" dirty="0" smtClean="0">
-                <a:cs typeface="American Typewriter"/>
-              </a:rPr>
-              <a:t>which </a:t>
-            </a:r>
-            <a:r>
-              <a:rPr lang="en-US" sz="1000" dirty="0">
-                <a:cs typeface="American Typewriter"/>
-              </a:rPr>
-              <a:t>calls </a:t>
-            </a:r>
-            <a:r>
-              <a:rPr lang="en-US" sz="1000" dirty="0" smtClean="0">
-                <a:solidFill>
-                  <a:srgbClr val="FF0000"/>
-                </a:solidFill>
-                <a:latin typeface="American Typewriter"/>
-                <a:cs typeface="American Typewriter"/>
-              </a:rPr>
-              <a:t>readSWIFTv3_AQD.m</a:t>
-            </a:r>
             <a:endParaRPr lang="en-US" sz="1000" dirty="0">
               <a:solidFill>
                 <a:srgbClr val="FF0000"/>
@@ -7146,7 +7191,7 @@
             </a:endParaRPr>
           </a:p>
           <a:p>
-            <a:endParaRPr lang="en-US" sz="1000" dirty="0" smtClean="0">
+            <a:endParaRPr lang="en-US" sz="1000" dirty="0">
               <a:solidFill>
                 <a:srgbClr val="FF0000"/>
               </a:solidFill>
@@ -7154,6 +7199,15 @@
               <a:cs typeface="American Typewriter"/>
             </a:endParaRPr>
           </a:p>
+          <a:p>
+            <a:endParaRPr lang="en-US" sz="1000" dirty="0">
+              <a:solidFill>
+                <a:srgbClr val="FF0000"/>
+              </a:solidFill>
+              <a:latin typeface="American Typewriter"/>
+              <a:cs typeface="American Typewriter"/>
+            </a:endParaRPr>
+          </a:p>
         </p:txBody>
       </p:sp>
       <p:sp>
@@ -7164,7 +7218,7 @@
         </p:nvSpPr>
         <p:spPr>
           <a:xfrm>
-            <a:off x="4820916" y="7169897"/>
+            <a:off x="4820916" y="7090387"/>
             <a:ext cx="895806" cy="1652367"/>
           </a:xfrm>
           <a:custGeom>
@@ -7558,7 +7612,7 @@
         </p:nvSpPr>
         <p:spPr>
           <a:xfrm>
-            <a:off x="4237082" y="7175499"/>
+            <a:off x="4237082" y="7095989"/>
             <a:ext cx="863600" cy="676700"/>
           </a:xfrm>
           <a:custGeom>
@@ -8028,7 +8082,7 @@
         </p:nvSpPr>
         <p:spPr>
           <a:xfrm>
-            <a:off x="5628922" y="7509933"/>
+            <a:off x="5628922" y="7430423"/>
             <a:ext cx="1210588" cy="276999"/>
           </a:xfrm>
           <a:prstGeom prst="rect">
@@ -8048,10 +8102,9 @@
           <a:lstStyle/>
           <a:p>
             <a:r>
-              <a:rPr lang="en-US" sz="1200" dirty="0" smtClean="0"/>
+              <a:rPr lang="en-US" sz="1200" dirty="0"/>
               <a:t>time lapse video</a:t>
             </a:r>
-            <a:endParaRPr lang="en-US" sz="1200" dirty="0"/>
           </a:p>
         </p:txBody>
       </p:sp>
@@ -8063,8 +8116,8 @@
         </p:nvSpPr>
         <p:spPr>
           <a:xfrm>
-            <a:off x="897656" y="5486400"/>
-            <a:ext cx="5088128" cy="861774"/>
+            <a:off x="1006598" y="5486400"/>
+            <a:ext cx="4870243" cy="861774"/>
           </a:xfrm>
           <a:prstGeom prst="rect">
             <a:avLst/>
@@ -8079,15 +8132,15 @@
           <a:p>
             <a:pPr algn="ctr"/>
             <a:r>
-              <a:rPr lang="en-US" sz="1000" dirty="0" err="1" smtClean="0"/>
+              <a:rPr lang="en-US" sz="1000" dirty="0" err="1"/>
               <a:t>Matlab</a:t>
             </a:r>
             <a:r>
-              <a:rPr lang="en-US" sz="1000" dirty="0" smtClean="0"/>
+              <a:rPr lang="en-US" sz="1000" dirty="0"/>
               <a:t> script </a:t>
             </a:r>
             <a:r>
-              <a:rPr lang="en-US" sz="1000" dirty="0" err="1" smtClean="0">
+              <a:rPr lang="en-US" sz="1000" dirty="0" err="1">
                 <a:solidFill>
                   <a:srgbClr val="FF0000"/>
                 </a:solidFill>
@@ -8097,7 +8150,7 @@
               <a:t>concatSWIFT_offloadedSDcard.m</a:t>
             </a:r>
             <a:r>
-              <a:rPr lang="en-US" sz="1000" dirty="0" smtClean="0">
+              <a:rPr lang="en-US" sz="1000" dirty="0">
                 <a:latin typeface="American Typewriter"/>
                 <a:cs typeface="American Typewriter"/>
               </a:rPr>
@@ -8107,37 +8160,23 @@
           <a:p>
             <a:pPr algn="ctr"/>
             <a:r>
-              <a:rPr lang="en-US" sz="1000" dirty="0" smtClean="0">
+              <a:rPr lang="en-US" sz="1000" dirty="0">
                 <a:latin typeface="American Typewriter"/>
                 <a:cs typeface="American Typewriter"/>
               </a:rPr>
-              <a:t>telemetry SBD files for </a:t>
-            </a:r>
-            <a:r>
-              <a:rPr lang="en-US" sz="1000" i="1" dirty="0" smtClean="0">
-                <a:latin typeface="American Typewriter"/>
-                <a:cs typeface="American Typewriter"/>
-              </a:rPr>
-              <a:t>all</a:t>
-            </a:r>
-            <a:r>
-              <a:rPr lang="en-US" sz="1000" dirty="0" smtClean="0">
-                <a:latin typeface="American Typewriter"/>
-                <a:cs typeface="American Typewriter"/>
-              </a:rPr>
-              <a:t> bursts (not just first each hour, as was done onboard), </a:t>
-            </a:r>
-          </a:p>
-          <a:p>
-            <a:pPr algn="ctr"/>
-            <a:r>
-              <a:rPr lang="en-US" sz="1000" dirty="0" smtClean="0">
+              <a:t>telemetry SBD files for all bursts of data</a:t>
+            </a:r>
+          </a:p>
+          <a:p>
+            <a:pPr algn="ctr"/>
+            <a:r>
+              <a:rPr lang="en-US" sz="1000" dirty="0">
                 <a:cs typeface="American Typewriter"/>
               </a:rPr>
               <a:t>and then calls </a:t>
             </a:r>
             <a:r>
-              <a:rPr lang="en-US" sz="1000" dirty="0" err="1" smtClean="0">
+              <a:rPr lang="en-US" sz="1000" dirty="0" err="1">
                 <a:solidFill>
                   <a:srgbClr val="FF0000"/>
                 </a:solidFill>
@@ -8147,14 +8186,14 @@
               <a:t>compileSWIFT_SBDservertelemetry.m</a:t>
             </a:r>
             <a:r>
-              <a:rPr lang="en-US" sz="1000" dirty="0" smtClean="0">
+              <a:rPr lang="en-US" sz="1000" dirty="0">
                 <a:latin typeface="American Typewriter"/>
                 <a:cs typeface="American Typewriter"/>
               </a:rPr>
               <a:t> </a:t>
             </a:r>
             <a:r>
-              <a:rPr lang="en-US" sz="1000" dirty="0" smtClean="0">
+              <a:rPr lang="en-US" sz="1000" dirty="0">
                 <a:cs typeface="American Typewriter"/>
               </a:rPr>
               <a:t>to loop thru all the SBD files   </a:t>
@@ -8163,13 +8202,13 @@
           <a:p>
             <a:pPr algn="ctr"/>
             <a:r>
-              <a:rPr lang="en-US" sz="1000" dirty="0" smtClean="0">
+              <a:rPr lang="en-US" sz="1000" dirty="0">
                 <a:cs typeface="American Typewriter"/>
               </a:rPr>
               <a:t>and reads the binary files using the function </a:t>
             </a:r>
             <a:r>
-              <a:rPr lang="en-US" sz="1000" dirty="0" err="1" smtClean="0">
+              <a:rPr lang="en-US" sz="1000" dirty="0" err="1">
                 <a:solidFill>
                   <a:srgbClr val="FF0000"/>
                 </a:solidFill>
@@ -8178,7 +8217,7 @@
               </a:rPr>
               <a:t>readSWIFT_SBD.m</a:t>
             </a:r>
-            <a:endParaRPr lang="en-US" sz="1000" dirty="0" smtClean="0">
+            <a:endParaRPr lang="en-US" sz="1000" dirty="0">
               <a:solidFill>
                 <a:srgbClr val="FF0000"/>
               </a:solidFill>
@@ -8189,13 +8228,13 @@
           <a:p>
             <a:pPr algn="ctr"/>
             <a:r>
-              <a:rPr lang="en-US" sz="1000" dirty="0" smtClean="0">
+              <a:rPr lang="en-US" sz="1000" dirty="0">
                 <a:cs typeface="American Typewriter"/>
               </a:rPr>
               <a:t>then finally plots the whole dataset using the function </a:t>
             </a:r>
             <a:r>
-              <a:rPr lang="en-US" sz="1000" dirty="0" err="1" smtClean="0">
+              <a:rPr lang="en-US" sz="1000" dirty="0" err="1">
                 <a:solidFill>
                   <a:srgbClr val="FF0000"/>
                 </a:solidFill>
@@ -8241,16 +8280,15 @@
           <a:lstStyle/>
           <a:p>
             <a:r>
-              <a:rPr lang="en-US" dirty="0" smtClean="0"/>
+              <a:rPr lang="en-US" dirty="0"/>
               <a:t>AQH or AQD</a:t>
             </a:r>
           </a:p>
           <a:p>
             <a:r>
-              <a:rPr lang="en-US" dirty="0" smtClean="0"/>
+              <a:rPr lang="en-US" dirty="0"/>
               <a:t>or Signature</a:t>
             </a:r>
-            <a:endParaRPr lang="en-US" dirty="0"/>
           </a:p>
         </p:txBody>
       </p:sp>
@@ -8283,25 +8321,24 @@
           <a:p>
             <a:pPr algn="ctr"/>
             <a:r>
-              <a:rPr lang="en-US" dirty="0" smtClean="0"/>
+              <a:rPr lang="en-US" dirty="0"/>
               <a:t>GPS and IMU</a:t>
             </a:r>
           </a:p>
           <a:p>
             <a:pPr algn="ctr"/>
             <a:r>
-              <a:rPr lang="en-US" sz="1000" dirty="0" smtClean="0"/>
+              <a:rPr lang="en-US" sz="1000" dirty="0"/>
               <a:t>(</a:t>
             </a:r>
             <a:r>
-              <a:rPr lang="en-US" sz="1000" dirty="0" err="1" smtClean="0"/>
+              <a:rPr lang="en-US" sz="1000" dirty="0" err="1"/>
               <a:t>Microstrain</a:t>
             </a:r>
             <a:r>
-              <a:rPr lang="en-US" sz="1000" dirty="0" smtClean="0"/>
+              <a:rPr lang="en-US" sz="1000" dirty="0"/>
               <a:t> or SBG Ellipse)</a:t>
             </a:r>
-            <a:endParaRPr lang="en-US" sz="1000" dirty="0"/>
           </a:p>
         </p:txBody>
       </p:sp>
@@ -8333,10 +8370,9 @@
           <a:lstStyle/>
           <a:p>
             <a:r>
-              <a:rPr lang="en-US" dirty="0" smtClean="0"/>
+              <a:rPr lang="en-US" dirty="0"/>
               <a:t>CT-1</a:t>
             </a:r>
-            <a:endParaRPr lang="en-US" dirty="0"/>
           </a:p>
         </p:txBody>
       </p:sp>
@@ -8369,47 +8405,46 @@
           <a:p>
             <a:pPr algn="ctr"/>
             <a:r>
-              <a:rPr lang="en-US" dirty="0" smtClean="0"/>
+              <a:rPr lang="en-US" dirty="0"/>
               <a:t>Met </a:t>
             </a:r>
           </a:p>
           <a:p>
             <a:pPr algn="ctr"/>
             <a:r>
-              <a:rPr lang="en-US" sz="1000" dirty="0" err="1" smtClean="0"/>
+              <a:rPr lang="en-US" sz="1000" dirty="0" err="1"/>
               <a:t>Airmar</a:t>
             </a:r>
-            <a:endParaRPr lang="en-US" sz="1000" dirty="0" smtClean="0"/>
-          </a:p>
-          <a:p>
-            <a:pPr algn="ctr"/>
-            <a:r>
-              <a:rPr lang="en-US" sz="1000" dirty="0" smtClean="0"/>
+            <a:endParaRPr lang="en-US" sz="1000" dirty="0"/>
+          </a:p>
+          <a:p>
+            <a:pPr algn="ctr"/>
+            <a:r>
+              <a:rPr lang="en-US" sz="1000" dirty="0"/>
               <a:t>or</a:t>
             </a:r>
           </a:p>
           <a:p>
             <a:pPr algn="ctr"/>
             <a:r>
-              <a:rPr lang="en-US" sz="1000" dirty="0" err="1" smtClean="0"/>
+              <a:rPr lang="en-US" sz="1000" dirty="0" err="1"/>
               <a:t>Vaisala</a:t>
             </a:r>
-            <a:endParaRPr lang="en-US" sz="1000" dirty="0" smtClean="0"/>
-          </a:p>
-          <a:p>
-            <a:pPr algn="ctr"/>
-            <a:r>
-              <a:rPr lang="en-US" sz="1000" dirty="0" smtClean="0"/>
+            <a:endParaRPr lang="en-US" sz="1000" dirty="0"/>
+          </a:p>
+          <a:p>
+            <a:pPr algn="ctr"/>
+            <a:r>
+              <a:rPr lang="en-US" sz="1000" dirty="0"/>
               <a:t>or </a:t>
             </a:r>
           </a:p>
           <a:p>
             <a:pPr algn="ctr"/>
             <a:r>
-              <a:rPr lang="en-US" sz="1000" dirty="0" smtClean="0"/>
+              <a:rPr lang="en-US" sz="1000" dirty="0"/>
               <a:t>3D sonic </a:t>
             </a:r>
-            <a:endParaRPr lang="en-US" sz="1000" dirty="0"/>
           </a:p>
         </p:txBody>
       </p:sp>
@@ -8441,10 +8476,9 @@
           <a:lstStyle/>
           <a:p>
             <a:r>
-              <a:rPr lang="en-US" dirty="0" smtClean="0"/>
+              <a:rPr lang="en-US" dirty="0"/>
               <a:t>Camera</a:t>
             </a:r>
-            <a:endParaRPr lang="en-US" dirty="0"/>
           </a:p>
         </p:txBody>
       </p:sp>
@@ -8476,10 +8510,9 @@
           <a:lstStyle/>
           <a:p>
             <a:r>
-              <a:rPr lang="en-US" dirty="0" smtClean="0"/>
+              <a:rPr lang="en-US" dirty="0"/>
               <a:t>CT-2</a:t>
             </a:r>
-            <a:endParaRPr lang="en-US" dirty="0"/>
           </a:p>
         </p:txBody>
       </p:sp>
@@ -8511,10 +8544,9 @@
           <a:lstStyle/>
           <a:p>
             <a:r>
-              <a:rPr lang="en-US" dirty="0" smtClean="0"/>
+              <a:rPr lang="en-US" dirty="0"/>
               <a:t>CT-3</a:t>
             </a:r>
-            <a:endParaRPr lang="en-US" dirty="0"/>
           </a:p>
         </p:txBody>
       </p:sp>
@@ -8586,7 +8618,7 @@
           <a:lstStyle/>
           <a:p>
             <a:r>
-              <a:rPr lang="en-US" sz="1000" dirty="0" smtClean="0">
+              <a:rPr lang="en-US" sz="1000" dirty="0">
                 <a:solidFill>
                   <a:schemeClr val="tx1">
                     <a:lumMod val="50000"/>
@@ -8596,14 +8628,6 @@
               </a:rPr>
               <a:t>optional</a:t>
             </a:r>
-            <a:endParaRPr lang="en-US" sz="1000" dirty="0">
-              <a:solidFill>
-                <a:schemeClr val="tx1">
-                  <a:lumMod val="50000"/>
-                  <a:lumOff val="50000"/>
-                </a:schemeClr>
-              </a:solidFill>
-            </a:endParaRPr>
           </a:p>
         </p:txBody>
       </p:sp>
@@ -8636,33 +8660,32 @@
           <a:p>
             <a:pPr algn="ctr"/>
             <a:r>
-              <a:rPr lang="en-US" dirty="0" smtClean="0"/>
+              <a:rPr lang="en-US" dirty="0"/>
               <a:t>raw files onboard SWIFT </a:t>
             </a:r>
           </a:p>
           <a:p>
             <a:pPr algn="ctr"/>
             <a:r>
-              <a:rPr lang="en-US" dirty="0" smtClean="0"/>
+              <a:rPr lang="en-US" dirty="0"/>
               <a:t>(</a:t>
             </a:r>
             <a:r>
-              <a:rPr lang="en-US" dirty="0" err="1" smtClean="0"/>
+              <a:rPr lang="en-US" dirty="0" err="1"/>
               <a:t>Sutron</a:t>
             </a:r>
             <a:r>
-              <a:rPr lang="en-US" dirty="0" smtClean="0"/>
+              <a:rPr lang="en-US" dirty="0"/>
               <a:t> </a:t>
             </a:r>
             <a:r>
-              <a:rPr lang="en-US" dirty="0" err="1" smtClean="0"/>
+              <a:rPr lang="en-US" dirty="0" err="1"/>
               <a:t>Xpert</a:t>
             </a:r>
             <a:r>
-              <a:rPr lang="en-US" dirty="0" smtClean="0"/>
+              <a:rPr lang="en-US" dirty="0"/>
               <a:t> SD card, directories by com port)</a:t>
             </a:r>
-            <a:endParaRPr lang="en-US" dirty="0"/>
           </a:p>
         </p:txBody>
       </p:sp>
@@ -8729,38 +8752,37 @@
           <a:p>
             <a:pPr algn="ctr"/>
             <a:r>
-              <a:rPr lang="en-US" sz="1000" dirty="0" smtClean="0"/>
+              <a:rPr lang="en-US" sz="1000" dirty="0"/>
               <a:t>Dissipation rate profile (AQH)</a:t>
             </a:r>
           </a:p>
           <a:p>
             <a:pPr algn="ctr"/>
             <a:r>
-              <a:rPr lang="en-US" sz="1000" dirty="0" smtClean="0"/>
+              <a:rPr lang="en-US" sz="1000" dirty="0"/>
               <a:t>or </a:t>
             </a:r>
           </a:p>
           <a:p>
             <a:pPr algn="ctr"/>
             <a:r>
-              <a:rPr lang="en-US" sz="1000" dirty="0" smtClean="0"/>
+              <a:rPr lang="en-US" sz="1000" dirty="0"/>
               <a:t>current profile (AQD)</a:t>
             </a:r>
           </a:p>
           <a:p>
             <a:pPr algn="ctr"/>
             <a:r>
-              <a:rPr lang="en-US" sz="1000" dirty="0" smtClean="0"/>
+              <a:rPr lang="en-US" sz="1000" dirty="0"/>
               <a:t>or </a:t>
             </a:r>
           </a:p>
           <a:p>
             <a:pPr algn="ctr"/>
             <a:r>
-              <a:rPr lang="en-US" sz="1000" dirty="0" smtClean="0"/>
+              <a:rPr lang="en-US" sz="1000" dirty="0"/>
               <a:t>dissipation + currents (Sig)</a:t>
             </a:r>
-            <a:endParaRPr lang="en-US" sz="1000" dirty="0"/>
           </a:p>
         </p:txBody>
       </p:sp>
@@ -8788,21 +8810,21 @@
           <a:p>
             <a:pPr algn="ctr"/>
             <a:r>
-              <a:rPr lang="en-US" sz="1000" dirty="0" smtClean="0"/>
+              <a:rPr lang="en-US" sz="1000" dirty="0"/>
               <a:t>serial</a:t>
             </a:r>
           </a:p>
           <a:p>
             <a:pPr algn="ctr"/>
             <a:r>
-              <a:rPr lang="en-US" sz="1000" dirty="0" smtClean="0"/>
+              <a:rPr lang="en-US" sz="1000" dirty="0"/>
               <a:t>4 Hz or 1 Hz binary</a:t>
             </a:r>
           </a:p>
           <a:p>
             <a:pPr algn="ctr"/>
             <a:r>
-              <a:rPr lang="en-US" sz="1000" dirty="0" smtClean="0"/>
+              <a:rPr lang="en-US" sz="1000" dirty="0"/>
               <a:t>or 8 Hz binary</a:t>
             </a:r>
           </a:p>
@@ -9054,17 +9076,16 @@
           <a:p>
             <a:pPr algn="ctr"/>
             <a:r>
-              <a:rPr lang="en-US" sz="1000" dirty="0" smtClean="0"/>
+              <a:rPr lang="en-US" sz="1000" dirty="0"/>
               <a:t>serial</a:t>
             </a:r>
           </a:p>
           <a:p>
             <a:pPr algn="ctr"/>
             <a:r>
-              <a:rPr lang="en-US" sz="1000" dirty="0" smtClean="0"/>
+              <a:rPr lang="en-US" sz="1000" dirty="0"/>
               <a:t>25 Hz binary</a:t>
             </a:r>
-            <a:endParaRPr lang="en-US" sz="1000" dirty="0"/>
           </a:p>
         </p:txBody>
       </p:sp>
@@ -9092,7 +9113,7 @@
           <a:p>
             <a:pPr algn="ctr"/>
             <a:r>
-              <a:rPr lang="en-US" sz="1000" dirty="0" smtClean="0"/>
+              <a:rPr lang="en-US" sz="1000" dirty="0"/>
               <a:t>serial</a:t>
             </a:r>
           </a:p>
@@ -9100,13 +9121,8 @@
             <a:pPr algn="ctr"/>
             <a:r>
               <a:rPr lang="en-US" sz="1000" dirty="0"/>
-              <a:t>1</a:t>
-            </a:r>
-            <a:r>
-              <a:rPr lang="en-US" sz="1000" dirty="0" smtClean="0"/>
-              <a:t> Hz ASCII</a:t>
-            </a:r>
-            <a:endParaRPr lang="en-US" sz="1000" dirty="0"/>
+              <a:t>1 Hz ASCII</a:t>
+            </a:r>
           </a:p>
         </p:txBody>
       </p:sp>
@@ -9134,7 +9150,7 @@
           <a:p>
             <a:pPr algn="ctr"/>
             <a:r>
-              <a:rPr lang="en-US" sz="1000" dirty="0" smtClean="0"/>
+              <a:rPr lang="en-US" sz="1000" dirty="0"/>
               <a:t>serial</a:t>
             </a:r>
           </a:p>
@@ -9142,13 +9158,8 @@
             <a:pPr algn="ctr"/>
             <a:r>
               <a:rPr lang="en-US" sz="1000" dirty="0"/>
-              <a:t>1</a:t>
-            </a:r>
-            <a:r>
-              <a:rPr lang="en-US" sz="1000" dirty="0" smtClean="0"/>
-              <a:t> Hz ASCII</a:t>
-            </a:r>
-            <a:endParaRPr lang="en-US" sz="1000" dirty="0"/>
+              <a:t>1 Hz ASCII</a:t>
+            </a:r>
           </a:p>
         </p:txBody>
       </p:sp>
@@ -9176,7 +9187,7 @@
           <a:p>
             <a:pPr algn="ctr"/>
             <a:r>
-              <a:rPr lang="en-US" sz="1000" dirty="0" smtClean="0"/>
+              <a:rPr lang="en-US" sz="1000" dirty="0"/>
               <a:t>serial</a:t>
             </a:r>
           </a:p>
@@ -9184,13 +9195,8 @@
             <a:pPr algn="ctr"/>
             <a:r>
               <a:rPr lang="en-US" sz="1000" dirty="0"/>
-              <a:t>1</a:t>
-            </a:r>
-            <a:r>
-              <a:rPr lang="en-US" sz="1000" dirty="0" smtClean="0"/>
-              <a:t> Hz ASCII</a:t>
-            </a:r>
-            <a:endParaRPr lang="en-US" sz="1000" dirty="0"/>
+              <a:t>1 Hz ASCII</a:t>
+            </a:r>
           </a:p>
         </p:txBody>
       </p:sp>
@@ -9218,24 +9224,23 @@
           <a:p>
             <a:pPr algn="ctr"/>
             <a:r>
-              <a:rPr lang="en-US" sz="1000" dirty="0" smtClean="0"/>
+              <a:rPr lang="en-US" sz="1000" dirty="0"/>
               <a:t> 4 Hz NMEA</a:t>
             </a:r>
           </a:p>
           <a:p>
             <a:pPr algn="ctr"/>
             <a:r>
-              <a:rPr lang="en-US" sz="1000" dirty="0" smtClean="0"/>
+              <a:rPr lang="en-US" sz="1000" dirty="0"/>
               <a:t>or 1 Hz SDI-12</a:t>
             </a:r>
           </a:p>
           <a:p>
             <a:pPr algn="ctr"/>
             <a:r>
-              <a:rPr lang="en-US" sz="1000" dirty="0" smtClean="0"/>
+              <a:rPr lang="en-US" sz="1000" dirty="0"/>
               <a:t>or 10 Hz ASCII</a:t>
             </a:r>
-            <a:endParaRPr lang="en-US" sz="1000" dirty="0"/>
           </a:p>
         </p:txBody>
       </p:sp>
@@ -9263,17 +9268,16 @@
           <a:p>
             <a:pPr algn="ctr"/>
             <a:r>
-              <a:rPr lang="en-US" sz="1000" dirty="0" smtClean="0"/>
+              <a:rPr lang="en-US" sz="1000" dirty="0"/>
               <a:t>serial</a:t>
             </a:r>
           </a:p>
           <a:p>
             <a:pPr algn="ctr"/>
             <a:r>
-              <a:rPr lang="en-US" sz="1000" dirty="0" smtClean="0"/>
+              <a:rPr lang="en-US" sz="1000" dirty="0"/>
               <a:t>0.25 Hz jpg</a:t>
             </a:r>
-            <a:endParaRPr lang="en-US" sz="1000" dirty="0"/>
           </a:p>
         </p:txBody>
       </p:sp>
@@ -9301,29 +9305,28 @@
           <a:p>
             <a:pPr algn="ctr"/>
             <a:r>
-              <a:rPr lang="en-US" sz="1000" dirty="0" smtClean="0"/>
+              <a:rPr lang="en-US" sz="1000" dirty="0"/>
               <a:t>wave spectra</a:t>
             </a:r>
           </a:p>
           <a:p>
             <a:pPr algn="ctr"/>
             <a:r>
-              <a:rPr lang="en-US" sz="1000" dirty="0" smtClean="0"/>
+              <a:rPr lang="en-US" sz="1000" dirty="0"/>
               <a:t>directional </a:t>
             </a:r>
             <a:r>
-              <a:rPr lang="en-US" sz="1000" dirty="0" err="1" smtClean="0"/>
+              <a:rPr lang="en-US" sz="1000" dirty="0" err="1"/>
               <a:t>coefs</a:t>
             </a:r>
-            <a:endParaRPr lang="en-US" sz="1000" dirty="0" smtClean="0"/>
-          </a:p>
-          <a:p>
-            <a:pPr algn="ctr"/>
-            <a:r>
-              <a:rPr lang="en-US" sz="1000" dirty="0" smtClean="0"/>
+            <a:endParaRPr lang="en-US" sz="1000" dirty="0"/>
+          </a:p>
+          <a:p>
+            <a:pPr algn="ctr"/>
+            <a:r>
+              <a:rPr lang="en-US" sz="1000" dirty="0"/>
               <a:t>bulk parameters</a:t>
             </a:r>
-            <a:endParaRPr lang="en-US" sz="1000" dirty="0"/>
           </a:p>
         </p:txBody>
       </p:sp>
@@ -9351,21 +9354,20 @@
           <a:p>
             <a:pPr algn="ctr"/>
             <a:r>
-              <a:rPr lang="en-US" sz="1000" dirty="0" smtClean="0"/>
+              <a:rPr lang="en-US" sz="1000" dirty="0"/>
               <a:t>mean value</a:t>
             </a:r>
           </a:p>
           <a:p>
             <a:pPr algn="ctr"/>
             <a:r>
-              <a:rPr lang="en-US" sz="1000" dirty="0" err="1" smtClean="0"/>
+              <a:rPr lang="en-US" sz="1000" dirty="0" err="1"/>
               <a:t>std</a:t>
             </a:r>
             <a:r>
-              <a:rPr lang="en-US" sz="1000" dirty="0" smtClean="0"/>
+              <a:rPr lang="en-US" sz="1000" dirty="0"/>
               <a:t> deviation</a:t>
             </a:r>
-            <a:endParaRPr lang="en-US" sz="1000" dirty="0"/>
           </a:p>
         </p:txBody>
       </p:sp>
@@ -9393,21 +9395,20 @@
           <a:p>
             <a:pPr algn="ctr"/>
             <a:r>
-              <a:rPr lang="en-US" sz="1000" dirty="0" smtClean="0"/>
+              <a:rPr lang="en-US" sz="1000" dirty="0"/>
               <a:t>mean value</a:t>
             </a:r>
           </a:p>
           <a:p>
             <a:pPr algn="ctr"/>
             <a:r>
-              <a:rPr lang="en-US" sz="1000" dirty="0" err="1" smtClean="0"/>
+              <a:rPr lang="en-US" sz="1000" dirty="0" err="1"/>
               <a:t>std</a:t>
             </a:r>
             <a:r>
-              <a:rPr lang="en-US" sz="1000" dirty="0" smtClean="0"/>
+              <a:rPr lang="en-US" sz="1000" dirty="0"/>
               <a:t> deviation</a:t>
             </a:r>
-            <a:endParaRPr lang="en-US" sz="1000" dirty="0"/>
           </a:p>
         </p:txBody>
       </p:sp>
@@ -9435,21 +9436,20 @@
           <a:p>
             <a:pPr algn="ctr"/>
             <a:r>
-              <a:rPr lang="en-US" sz="1000" dirty="0" smtClean="0"/>
+              <a:rPr lang="en-US" sz="1000" dirty="0"/>
               <a:t>mean value</a:t>
             </a:r>
           </a:p>
           <a:p>
             <a:pPr algn="ctr"/>
             <a:r>
-              <a:rPr lang="en-US" sz="1000" dirty="0" err="1" smtClean="0"/>
+              <a:rPr lang="en-US" sz="1000" dirty="0" err="1"/>
               <a:t>std</a:t>
             </a:r>
             <a:r>
-              <a:rPr lang="en-US" sz="1000" dirty="0" smtClean="0"/>
+              <a:rPr lang="en-US" sz="1000" dirty="0"/>
               <a:t> deviation</a:t>
             </a:r>
-            <a:endParaRPr lang="en-US" sz="1000" dirty="0"/>
           </a:p>
         </p:txBody>
       </p:sp>
@@ -9477,42 +9477,41 @@
           <a:p>
             <a:pPr algn="ctr"/>
             <a:r>
-              <a:rPr lang="en-US" sz="1000" dirty="0" smtClean="0"/>
+              <a:rPr lang="en-US" sz="1000" dirty="0"/>
               <a:t>mean value</a:t>
             </a:r>
           </a:p>
           <a:p>
             <a:pPr algn="ctr"/>
             <a:r>
-              <a:rPr lang="en-US" sz="1000" dirty="0" err="1" smtClean="0"/>
+              <a:rPr lang="en-US" sz="1000" dirty="0" err="1"/>
               <a:t>std</a:t>
             </a:r>
             <a:r>
-              <a:rPr lang="en-US" sz="1000" dirty="0" smtClean="0"/>
+              <a:rPr lang="en-US" sz="1000" dirty="0"/>
               <a:t> deviation</a:t>
             </a:r>
           </a:p>
           <a:p>
             <a:pPr algn="ctr"/>
             <a:r>
-              <a:rPr lang="en-US" sz="1000" dirty="0" smtClean="0"/>
+              <a:rPr lang="en-US" sz="1000" dirty="0"/>
               <a:t>or </a:t>
             </a:r>
           </a:p>
           <a:p>
             <a:pPr algn="ctr"/>
             <a:r>
-              <a:rPr lang="en-US" sz="1000" dirty="0" smtClean="0"/>
+              <a:rPr lang="en-US" sz="1000" dirty="0"/>
               <a:t>inertial dissipation</a:t>
             </a:r>
           </a:p>
           <a:p>
             <a:pPr algn="ctr"/>
             <a:r>
-              <a:rPr lang="en-US" sz="1000" dirty="0" smtClean="0"/>
+              <a:rPr lang="en-US" sz="1000" dirty="0"/>
               <a:t>(3D sonic only)</a:t>
             </a:r>
-            <a:endParaRPr lang="en-US" sz="1000" dirty="0"/>
           </a:p>
         </p:txBody>
       </p:sp>
@@ -9540,8 +9539,48 @@
           <a:p>
             <a:pPr algn="ctr"/>
             <a:r>
-              <a:rPr lang="en-US" sz="1000" dirty="0" smtClean="0"/>
+              <a:rPr lang="en-US" sz="1000" dirty="0"/>
               <a:t>n/a</a:t>
+            </a:r>
+          </a:p>
+        </p:txBody>
+      </p:sp>
+      <p:sp>
+        <p:nvSpPr>
+          <p:cNvPr id="3" name="Rectangle 2">
+            <a:extLst>
+              <a:ext uri="{FF2B5EF4-FFF2-40B4-BE49-F238E27FC236}">
+                <a16:creationId xmlns:a16="http://schemas.microsoft.com/office/drawing/2014/main" id="{F0B6902F-BE69-8F4B-8D98-0420CAD072B3}"/>
+              </a:ext>
+            </a:extLst>
+          </p:cNvPr>
+          <p:cNvSpPr/>
+          <p:nvPr/>
+        </p:nvSpPr>
+        <p:spPr>
+          <a:xfrm>
+            <a:off x="5598451" y="7726858"/>
+            <a:ext cx="1345240" cy="246221"/>
+          </a:xfrm>
+          <a:prstGeom prst="rect">
+            <a:avLst/>
+          </a:prstGeom>
+        </p:spPr>
+        <p:txBody>
+          <a:bodyPr wrap="none">
+            <a:spAutoFit/>
+          </a:bodyPr>
+          <a:lstStyle/>
+          <a:p>
+            <a:r>
+              <a:rPr lang="en-US" sz="1000" dirty="0" err="1">
+                <a:solidFill>
+                  <a:srgbClr val="FF0000"/>
+                </a:solidFill>
+                <a:latin typeface="American Typewriter"/>
+                <a:cs typeface="American Typewriter"/>
+              </a:rPr>
+              <a:t>SWIFTtimelapse.m</a:t>
             </a:r>
             <a:endParaRPr lang="en-US" sz="1000" dirty="0"/>
           </a:p>
@@ -9585,8 +9624,8 @@
         </p:nvSpPr>
         <p:spPr>
           <a:xfrm>
-            <a:off x="154627" y="188218"/>
-            <a:ext cx="6415238" cy="1077218"/>
+            <a:off x="200374" y="291586"/>
+            <a:ext cx="5912516" cy="738664"/>
           </a:xfrm>
           <a:prstGeom prst="rect">
             <a:avLst/>
@@ -9605,94 +9644,83 @@
           <a:lstStyle/>
           <a:p>
             <a:r>
-              <a:rPr lang="en-US" sz="1600" u="sng" dirty="0" smtClean="0"/>
-              <a:t>Notes</a:t>
-            </a:r>
-            <a:r>
-              <a:rPr lang="en-US" sz="1600" dirty="0" smtClean="0"/>
-              <a:t>: all </a:t>
-            </a:r>
-            <a:r>
-              <a:rPr lang="en-US" sz="1600" dirty="0" err="1" smtClean="0"/>
+              <a:rPr lang="en-US" sz="1400" dirty="0" err="1"/>
               <a:t>Matlab</a:t>
             </a:r>
             <a:r>
-              <a:rPr lang="en-US" sz="1600" dirty="0" smtClean="0"/>
-              <a:t> functions in ‘</a:t>
-            </a:r>
-            <a:r>
-              <a:rPr lang="en-US" sz="1600" dirty="0" err="1" smtClean="0"/>
+              <a:rPr lang="en-US" sz="1400" dirty="0"/>
+              <a:t> functions on GitHub at</a:t>
+            </a:r>
+          </a:p>
+          <a:p>
+            <a:r>
+              <a:rPr lang="en-US" sz="1400" dirty="0"/>
+              <a:t>	 </a:t>
+            </a:r>
+            <a:r>
+              <a:rPr lang="en-US" sz="1400" b="1" dirty="0">
+                <a:solidFill>
+                  <a:srgbClr val="0432FF"/>
+                </a:solidFill>
+              </a:rPr>
+              <a:t>https://</a:t>
+            </a:r>
+            <a:r>
+              <a:rPr lang="en-US" sz="1400" b="1" dirty="0" err="1">
+                <a:solidFill>
+                  <a:srgbClr val="0432FF"/>
+                </a:solidFill>
+              </a:rPr>
+              <a:t>github.com</a:t>
+            </a:r>
+            <a:r>
+              <a:rPr lang="en-US" sz="1400" b="1" dirty="0">
+                <a:solidFill>
+                  <a:srgbClr val="0432FF"/>
+                </a:solidFill>
+              </a:rPr>
+              <a:t>/</a:t>
+            </a:r>
+            <a:r>
+              <a:rPr lang="en-US" sz="1400" b="1" dirty="0" err="1">
+                <a:solidFill>
+                  <a:srgbClr val="0432FF"/>
+                </a:solidFill>
+              </a:rPr>
+              <a:t>jthomson-apluw</a:t>
+            </a:r>
+            <a:r>
+              <a:rPr lang="en-US" sz="1400" b="1" dirty="0">
+                <a:solidFill>
+                  <a:srgbClr val="0432FF"/>
+                </a:solidFill>
+              </a:rPr>
+              <a:t>/SWIFT-codes</a:t>
+            </a:r>
+          </a:p>
+          <a:p>
+            <a:r>
+              <a:rPr lang="en-US" sz="1400" dirty="0"/>
+              <a:t> or ‘</a:t>
+            </a:r>
+            <a:r>
+              <a:rPr lang="en-US" sz="1400" dirty="0" err="1"/>
               <a:t>SWIFTcodes</a:t>
             </a:r>
             <a:r>
-              <a:rPr lang="en-US" sz="1600" dirty="0" smtClean="0"/>
-              <a:t>’ </a:t>
-            </a:r>
-            <a:r>
-              <a:rPr lang="en-US" sz="1600" dirty="0" err="1" smtClean="0"/>
-              <a:t>Dropbox</a:t>
-            </a:r>
-            <a:r>
-              <a:rPr lang="en-US" sz="1600" dirty="0" smtClean="0"/>
-              <a:t> folder</a:t>
-            </a:r>
-          </a:p>
-          <a:p>
-            <a:r>
-              <a:rPr lang="en-US" sz="1600" dirty="0"/>
-              <a:t>	</a:t>
-            </a:r>
-            <a:r>
-              <a:rPr lang="en-US" sz="1600" dirty="0" smtClean="0"/>
-              <a:t>contact </a:t>
-            </a:r>
-            <a:r>
-              <a:rPr lang="en-US" sz="1600" dirty="0" smtClean="0">
+              <a:rPr lang="en-US" sz="1400" dirty="0"/>
+              <a:t>’ Dropbox folder (read only,   </a:t>
+            </a:r>
+            <a:r>
+              <a:rPr lang="en-US" sz="1400" dirty="0">
                 <a:hlinkClick r:id="rId2"/>
               </a:rPr>
               <a:t>jthomson@apl.uw.edu</a:t>
             </a:r>
             <a:r>
-              <a:rPr lang="en-US" sz="1600" dirty="0" smtClean="0"/>
-              <a:t> for access</a:t>
-            </a:r>
-          </a:p>
-          <a:p>
-            <a:r>
-              <a:rPr lang="en-US" sz="1600" dirty="0"/>
-              <a:t>	</a:t>
-            </a:r>
-            <a:r>
-              <a:rPr lang="en-US" sz="1600" dirty="0" smtClean="0"/>
-              <a:t>submit revisions to ‘beta’ subfolder, archive in ‘old’ folder</a:t>
-            </a:r>
-          </a:p>
-          <a:p>
-            <a:r>
-              <a:rPr lang="en-US" sz="1600" dirty="0"/>
-              <a:t>	</a:t>
-            </a:r>
-            <a:r>
-              <a:rPr lang="en-US" sz="1600" dirty="0" smtClean="0"/>
-              <a:t>.</a:t>
-            </a:r>
-            <a:r>
-              <a:rPr lang="en-US" sz="1600" dirty="0" err="1" smtClean="0"/>
-              <a:t>prj</a:t>
-            </a:r>
-            <a:r>
-              <a:rPr lang="en-US" sz="1600" dirty="0" smtClean="0"/>
-              <a:t> files and ‘</a:t>
-            </a:r>
-            <a:r>
-              <a:rPr lang="en-US" sz="1600" dirty="0" err="1" smtClean="0"/>
-              <a:t>codegen</a:t>
-            </a:r>
-            <a:r>
-              <a:rPr lang="en-US" sz="1600" dirty="0" smtClean="0"/>
-              <a:t>’ subfolder are C++ conversions (used onboard)</a:t>
-            </a:r>
-            <a:endParaRPr lang="en-US" sz="1600" dirty="0"/>
+              <a:rPr lang="en-US" sz="1400" dirty="0"/>
+              <a:t> for access)</a:t>
+            </a:r>
           </a:p>
         </p:txBody>
       </p:sp>
@@ -9724,7 +9752,7 @@
           <a:lstStyle/>
           <a:p>
             <a:r>
-              <a:rPr lang="en-US" sz="1600" u="sng" dirty="0" smtClean="0"/>
+              <a:rPr lang="en-US" sz="1600" u="sng" dirty="0"/>
               <a:t>Other codes (separate from data flow):</a:t>
             </a:r>
           </a:p>
@@ -9734,7 +9762,7 @@
               <a:t>	</a:t>
             </a:r>
             <a:r>
-              <a:rPr lang="en-US" sz="1400" dirty="0" err="1" smtClean="0">
+              <a:rPr lang="en-US" sz="1400" dirty="0" err="1">
                 <a:solidFill>
                   <a:srgbClr val="FF0000"/>
                 </a:solidFill>
@@ -9744,17 +9772,17 @@
               <a:t>timeaverageSWIFTdata.m</a:t>
             </a:r>
             <a:r>
-              <a:rPr lang="en-US" sz="1400" dirty="0" smtClean="0"/>
+              <a:rPr lang="en-US" sz="1400" dirty="0"/>
               <a:t> makes longer ensemble (burst) averages</a:t>
             </a:r>
           </a:p>
           <a:p>
             <a:r>
-              <a:rPr lang="en-US" sz="1400" dirty="0" smtClean="0"/>
+              <a:rPr lang="en-US" sz="1400" dirty="0"/>
               <a:t>	</a:t>
             </a:r>
             <a:r>
-              <a:rPr lang="en-US" sz="1400" dirty="0" err="1" smtClean="0">
+              <a:rPr lang="en-US" sz="1400" dirty="0" err="1">
                 <a:solidFill>
                   <a:srgbClr val="FF0000"/>
                 </a:solidFill>
@@ -9764,7 +9792,7 @@
               <a:t>SWIFTdirectionalspectra.m</a:t>
             </a:r>
             <a:r>
-              <a:rPr lang="en-US" sz="1400" dirty="0" smtClean="0"/>
+              <a:rPr lang="en-US" sz="1400" dirty="0"/>
               <a:t> estimates average directional spectra</a:t>
             </a:r>
           </a:p>
@@ -9774,7 +9802,7 @@
               <a:t>		</a:t>
             </a:r>
             <a:r>
-              <a:rPr lang="en-US" sz="1400" dirty="0" err="1" smtClean="0">
+              <a:rPr lang="en-US" sz="1400" dirty="0" err="1">
                 <a:solidFill>
                   <a:srgbClr val="FF0000"/>
                 </a:solidFill>
@@ -9784,7 +9812,7 @@
               <a:t>MEM_directionalestimator.m</a:t>
             </a:r>
             <a:r>
-              <a:rPr lang="en-US" sz="1400" dirty="0" smtClean="0"/>
+              <a:rPr lang="en-US" sz="1400" dirty="0"/>
               <a:t> subroutine</a:t>
             </a:r>
           </a:p>
@@ -9794,7 +9822,7 @@
               <a:t>		</a:t>
             </a:r>
             <a:r>
-              <a:rPr lang="en-US" sz="1400" dirty="0" err="1" smtClean="0">
+              <a:rPr lang="en-US" sz="1400" dirty="0" err="1">
                 <a:solidFill>
                   <a:srgbClr val="FF0000"/>
                 </a:solidFill>
@@ -9804,7 +9832,7 @@
               <a:t>polarPcolor.m</a:t>
             </a:r>
             <a:r>
-              <a:rPr lang="en-US" sz="1400" dirty="0" smtClean="0"/>
+              <a:rPr lang="en-US" sz="1400" dirty="0"/>
               <a:t> subroutine</a:t>
             </a:r>
           </a:p>
@@ -9814,7 +9842,7 @@
               <a:t>	</a:t>
             </a:r>
             <a:r>
-              <a:rPr lang="en-US" sz="1400" dirty="0" err="1" smtClean="0">
+              <a:rPr lang="en-US" sz="1400" dirty="0" err="1">
                 <a:solidFill>
                   <a:srgbClr val="FF0000"/>
                 </a:solidFill>
@@ -9824,7 +9852,7 @@
               <a:t>wavenumber.m</a:t>
             </a:r>
             <a:r>
-              <a:rPr lang="en-US" sz="1400" dirty="0" smtClean="0"/>
+              <a:rPr lang="en-US" sz="1400" dirty="0"/>
               <a:t> solves dispersion in intermediate depth</a:t>
             </a:r>
           </a:p>
@@ -9834,27 +9862,7 @@
               <a:t>	</a:t>
             </a:r>
             <a:r>
-              <a:rPr lang="en-US" sz="1400" dirty="0" err="1" smtClean="0">
-                <a:solidFill>
-                  <a:srgbClr val="FF0000"/>
-                </a:solidFill>
-                <a:latin typeface="American Typewriter"/>
-                <a:cs typeface="American Typewriter"/>
-              </a:rPr>
-              <a:t>concatSWIFT_SBDemailattachments.m</a:t>
-            </a:r>
-            <a:r>
-              <a:rPr lang="en-US" sz="1400" dirty="0" smtClean="0"/>
-              <a:t> is for email SBD usage (backup)</a:t>
-            </a:r>
-          </a:p>
-          <a:p>
-            <a:r>
-              <a:rPr lang="en-US" sz="1400" dirty="0" smtClean="0"/>
-              <a:t>	</a:t>
-            </a:r>
-            <a:r>
-              <a:rPr lang="en-US" sz="1400" dirty="0" smtClean="0">
+              <a:rPr lang="en-US" sz="1400" dirty="0">
                 <a:solidFill>
                   <a:srgbClr val="FF0000"/>
                 </a:solidFill>
@@ -9864,25 +9872,25 @@
               <a:t>readSWIFTv3_ACS.m</a:t>
             </a:r>
             <a:r>
-              <a:rPr lang="en-US" sz="1400" dirty="0" smtClean="0"/>
+              <a:rPr lang="en-US" sz="1400" dirty="0"/>
               <a:t>	 reads raw CT data (in ‘</a:t>
             </a:r>
             <a:r>
-              <a:rPr lang="en-US" sz="1400" dirty="0" err="1" smtClean="0"/>
+              <a:rPr lang="en-US" sz="1400" dirty="0" err="1"/>
               <a:t>ACS.dat</a:t>
             </a:r>
             <a:r>
-              <a:rPr lang="en-US" sz="1400" dirty="0" smtClean="0"/>
+              <a:rPr lang="en-US" sz="1400" dirty="0"/>
               <a:t>’ files)</a:t>
             </a:r>
           </a:p>
           <a:p>
             <a:r>
-              <a:rPr lang="en-US" sz="1400" dirty="0" smtClean="0"/>
+              <a:rPr lang="en-US" sz="1400" dirty="0"/>
               <a:t>	</a:t>
             </a:r>
             <a:r>
-              <a:rPr lang="en-US" sz="1400" dirty="0" smtClean="0">
+              <a:rPr lang="en-US" sz="1400" dirty="0">
                 <a:solidFill>
                   <a:srgbClr val="FF0000"/>
                 </a:solidFill>
@@ -9892,21 +9900,27 @@
               <a:t>readSWIFTv3_PB2.m</a:t>
             </a:r>
             <a:r>
-              <a:rPr lang="en-US" sz="1400" dirty="0" smtClean="0"/>
-              <a:t> reads raw Met data (in ‘PB2’ files),</a:t>
-            </a:r>
-            <a:r>
-              <a:rPr lang="is-IS" sz="1400" dirty="0" smtClean="0"/>
-              <a:t> includes GPS</a:t>
-            </a:r>
-          </a:p>
-          <a:p>
-            <a:r>
-              <a:rPr lang="en-US" sz="1400" dirty="0" smtClean="0"/>
+              <a:rPr lang="en-US" sz="1400" dirty="0"/>
+              <a:t> reads raw Met data (NMEA formant ‘PB2’ files)</a:t>
+            </a:r>
+          </a:p>
+          <a:p>
+            <a:r>
+              <a:rPr lang="en-US" sz="1400" dirty="0"/>
+              <a:t>		which</a:t>
+            </a:r>
+            <a:r>
+              <a:rPr lang="is-IS" sz="1400" dirty="0"/>
+              <a:t> includes a backup GPS feed</a:t>
+            </a:r>
+          </a:p>
+          <a:p>
+            <a:r>
+              <a:rPr lang="en-US" sz="1400" dirty="0"/>
               <a:t>	</a:t>
             </a:r>
             <a:r>
-              <a:rPr lang="en-US" sz="1400" dirty="0" err="1" smtClean="0">
+              <a:rPr lang="en-US" sz="1400" dirty="0" err="1">
                 <a:solidFill>
                   <a:srgbClr val="FF0000"/>
                 </a:solidFill>
@@ -9916,7 +9930,7 @@
               <a:t>SWIFT_breaker_detection.m</a:t>
             </a:r>
             <a:r>
-              <a:rPr lang="en-US" sz="1400" dirty="0" smtClean="0"/>
+              <a:rPr lang="en-US" sz="1400" dirty="0"/>
               <a:t> scores images for breaking waves</a:t>
             </a:r>
           </a:p>
@@ -9926,11 +9940,11 @@
               <a:t>		see ‘</a:t>
             </a:r>
             <a:r>
-              <a:rPr lang="en-US" sz="1400" dirty="0" err="1" smtClean="0"/>
+              <a:rPr lang="en-US" sz="1400" dirty="0" err="1"/>
               <a:t>ImageProcessing</a:t>
             </a:r>
             <a:r>
-              <a:rPr lang="en-US" sz="1400" dirty="0" smtClean="0"/>
+              <a:rPr lang="en-US" sz="1400" dirty="0"/>
               <a:t>’ subfolder</a:t>
             </a:r>
           </a:p>
@@ -9964,18 +9978,17 @@
           <a:lstStyle/>
           <a:p>
             <a:r>
-              <a:rPr lang="en-US" sz="1600" dirty="0" smtClean="0"/>
+              <a:rPr lang="en-US" sz="1600" dirty="0"/>
               <a:t>SWIFT data structure fields in </a:t>
             </a:r>
             <a:r>
-              <a:rPr lang="en-US" sz="1600" dirty="0" err="1" smtClean="0"/>
+              <a:rPr lang="en-US" sz="1600" dirty="0" err="1"/>
               <a:t>Matlab</a:t>
             </a:r>
             <a:r>
-              <a:rPr lang="en-US" sz="1600" dirty="0" smtClean="0"/>
+              <a:rPr lang="en-US" sz="1600" dirty="0"/>
               <a:t> (results by burst):</a:t>
             </a:r>
-            <a:endParaRPr lang="en-US" sz="1600" dirty="0"/>
           </a:p>
           <a:p>
             <a:r>
@@ -9986,11 +9999,10 @@
               <a:rPr lang="en-US" sz="900" dirty="0"/>
               <a:t>: vertical profiles of turbulent dissipation rate in W/kg (= m^2 / s^3) </a:t>
             </a:r>
-            <a:endParaRPr lang="en-US" sz="900" dirty="0" smtClean="0"/>
-          </a:p>
-          <a:p>
-            <a:r>
-              <a:rPr lang="en-US" sz="900" dirty="0" err="1" smtClean="0"/>
+          </a:p>
+          <a:p>
+            <a:r>
+              <a:rPr lang="en-US" sz="900" dirty="0" err="1"/>
               <a:t>SWIFT.uplooking.z</a:t>
             </a:r>
             <a:r>
@@ -10003,13 +10015,8 @@
             </a:r>
             <a:r>
               <a:rPr lang="en-US" sz="900" dirty="0"/>
-              <a:t> dissipation rate </a:t>
-            </a:r>
-            <a:r>
-              <a:rPr lang="en-US" sz="900" dirty="0" smtClean="0"/>
-              <a:t>profiles.  wave-following reference frame</a:t>
-            </a:r>
-            <a:endParaRPr lang="en-US" sz="900" dirty="0"/>
+              <a:t> dissipation rate profiles.  wave-following reference frame</a:t>
+            </a:r>
           </a:p>
           <a:p>
             <a:r>
@@ -10018,13 +10025,8 @@
             </a:r>
             <a:r>
               <a:rPr lang="en-US" sz="900" dirty="0"/>
-              <a:t>: vertical profiles of horizontal velocity magnitude, in m/s, relative to the float (not corrected for drift</a:t>
-            </a:r>
-            <a:r>
-              <a:rPr lang="en-US" sz="900" dirty="0" smtClean="0"/>
-              <a:t>)</a:t>
-            </a:r>
-            <a:endParaRPr lang="en-US" sz="900" dirty="0"/>
+              <a:t>: vertical profiles of horizontal velocity magnitude, in m/s, relative to the float (not corrected for drift)</a:t>
+            </a:r>
           </a:p>
           <a:p>
             <a:r>
@@ -10033,13 +10035,8 @@
             </a:r>
             <a:r>
               <a:rPr lang="en-US" sz="900" dirty="0"/>
-              <a:t>: depth bins, in meters, for the velocity </a:t>
-            </a:r>
-            <a:r>
-              <a:rPr lang="en-US" sz="900" dirty="0" smtClean="0"/>
-              <a:t>profiles</a:t>
-            </a:r>
-            <a:endParaRPr lang="en-US" sz="900" dirty="0"/>
+              <a:t>: depth bins, in meters, for the velocity profiles</a:t>
+            </a:r>
           </a:p>
           <a:p>
             <a:r>
@@ -10048,37 +10045,28 @@
             </a:r>
             <a:r>
               <a:rPr lang="en-US" sz="900" dirty="0"/>
-              <a:t>: true wind </a:t>
-            </a:r>
-            <a:r>
-              <a:rPr lang="en-US" sz="900" dirty="0" smtClean="0"/>
-              <a:t>direction FROM, in degrees CW relative to North</a:t>
-            </a:r>
-          </a:p>
-          <a:p>
-            <a:r>
-              <a:rPr lang="en-US" sz="900" dirty="0" err="1" smtClean="0"/>
+              <a:t>: true wind direction FROM, in degrees CW relative to North</a:t>
+            </a:r>
+          </a:p>
+          <a:p>
+            <a:r>
+              <a:rPr lang="en-US" sz="900" dirty="0" err="1"/>
               <a:t>SWIFT.winddirTstddev</a:t>
             </a:r>
             <a:r>
-              <a:rPr lang="en-US" sz="900" dirty="0" smtClean="0"/>
+              <a:rPr lang="en-US" sz="900" dirty="0"/>
               <a:t>: standard deviation of true wind direction, in degrees</a:t>
             </a:r>
           </a:p>
           <a:p>
             <a:r>
-              <a:rPr lang="en-US" sz="900" dirty="0" err="1" smtClean="0"/>
+              <a:rPr lang="en-US" sz="900" dirty="0" err="1"/>
               <a:t>SWIFT.windspd</a:t>
             </a:r>
             <a:r>
               <a:rPr lang="en-US" sz="900" dirty="0"/>
-              <a:t>: wind speed, in m/s, at 1 m height above the wave-following </a:t>
-            </a:r>
-            <a:r>
-              <a:rPr lang="en-US" sz="900" dirty="0" smtClean="0"/>
-              <a:t>surface</a:t>
-            </a:r>
-            <a:endParaRPr lang="en-US" sz="900" dirty="0"/>
+              <a:t>: wind speed, in m/s, at 1 m height above the wave-following surface</a:t>
+            </a:r>
           </a:p>
           <a:p>
             <a:r>
@@ -10087,13 +10075,8 @@
             </a:r>
             <a:r>
               <a:rPr lang="en-US" sz="900" dirty="0"/>
-              <a:t>: standard deviation, in m/s, of wind </a:t>
-            </a:r>
-            <a:r>
-              <a:rPr lang="en-US" sz="900" dirty="0" smtClean="0"/>
-              <a:t>speed</a:t>
-            </a:r>
-            <a:endParaRPr lang="en-US" sz="900" dirty="0"/>
+              <a:t>: standard deviation, in m/s, of wind speed</a:t>
+            </a:r>
           </a:p>
           <a:p>
             <a:r>
@@ -10110,13 +10093,8 @@
             </a:r>
             <a:r>
               <a:rPr lang="en-US" sz="900" dirty="0"/>
-              <a:t> format (serial days since 0 Jan 0000</a:t>
-            </a:r>
-            <a:r>
-              <a:rPr lang="en-US" sz="900" dirty="0" smtClean="0"/>
-              <a:t>)</a:t>
-            </a:r>
-            <a:endParaRPr lang="en-US" sz="900" dirty="0"/>
+              <a:t> format (serial days since 0 Jan 0000)</a:t>
+            </a:r>
           </a:p>
           <a:p>
             <a:r>
@@ -10125,13 +10103,8 @@
             </a:r>
             <a:r>
               <a:rPr lang="en-US" sz="900" dirty="0"/>
-              <a:t>: human readable date as day, month, </a:t>
-            </a:r>
-            <a:r>
-              <a:rPr lang="en-US" sz="900" dirty="0" smtClean="0"/>
-              <a:t>year</a:t>
-            </a:r>
-            <a:endParaRPr lang="en-US" sz="900" dirty="0"/>
+              <a:t>: human readable date as day, month, year</a:t>
+            </a:r>
           </a:p>
           <a:p>
             <a:r>
@@ -10148,13 +10121,8 @@
             </a:r>
             <a:r>
               <a:rPr lang="en-US" sz="900" dirty="0"/>
-              <a:t> C, at 1 m height above the wave-following </a:t>
-            </a:r>
-            <a:r>
-              <a:rPr lang="en-US" sz="900" dirty="0" smtClean="0"/>
-              <a:t>surface</a:t>
-            </a:r>
-            <a:endParaRPr lang="en-US" sz="900" dirty="0"/>
+              <a:t> C, at 1 m height above the wave-following surface</a:t>
+            </a:r>
           </a:p>
           <a:p>
             <a:r>
@@ -10171,13 +10139,8 @@
             </a:r>
             <a:r>
               <a:rPr lang="en-US" sz="900" dirty="0"/>
-              <a:t> </a:t>
-            </a:r>
-            <a:r>
-              <a:rPr lang="en-US" sz="900" dirty="0" smtClean="0"/>
-              <a:t>C</a:t>
-            </a:r>
-            <a:endParaRPr lang="en-US" sz="900" dirty="0"/>
+              <a:t> C</a:t>
+            </a:r>
           </a:p>
           <a:p>
             <a:r>
@@ -10186,13 +10149,8 @@
             </a:r>
             <a:r>
               <a:rPr lang="en-US" sz="900" dirty="0"/>
-              <a:t>: significant wave height, in </a:t>
-            </a:r>
-            <a:r>
-              <a:rPr lang="en-US" sz="900" dirty="0" smtClean="0"/>
-              <a:t>meters</a:t>
-            </a:r>
-            <a:endParaRPr lang="en-US" sz="900" dirty="0"/>
+              <a:t>: significant wave height, in meters</a:t>
+            </a:r>
           </a:p>
           <a:p>
             <a:r>
@@ -10201,13 +10159,8 @@
             </a:r>
             <a:r>
               <a:rPr lang="en-US" sz="900" dirty="0"/>
-              <a:t>: peak of period orbital velocity spectra (note convention is usually wave height spectrum</a:t>
-            </a:r>
-            <a:r>
-              <a:rPr lang="en-US" sz="900" dirty="0" smtClean="0"/>
-              <a:t>)</a:t>
-            </a:r>
-            <a:endParaRPr lang="en-US" sz="900" dirty="0"/>
+              <a:t>: peak of period orbital velocity spectra (note convention is usually wave height spectrum)</a:t>
+            </a:r>
           </a:p>
           <a:p>
             <a:r>
@@ -10216,23 +10169,11 @@
             </a:r>
             <a:r>
               <a:rPr lang="en-US" sz="900" dirty="0"/>
-              <a:t>: </a:t>
-            </a:r>
-            <a:r>
-              <a:rPr lang="en-US" sz="900" dirty="0" smtClean="0"/>
-              <a:t>true </a:t>
-            </a:r>
-            <a:r>
-              <a:rPr lang="en-US" sz="900" smtClean="0"/>
-              <a:t>wave</a:t>
+              <a:t>: true </a:t>
             </a:r>
             <a:r>
               <a:rPr lang="en-US" sz="900"/>
-              <a:t> </a:t>
-            </a:r>
-            <a:r>
-              <a:rPr lang="en-US" sz="900" smtClean="0"/>
-              <a:t>direction FROM</a:t>
+              <a:t>wave direction FROM</a:t>
             </a:r>
             <a:r>
               <a:rPr lang="en-US" sz="900" dirty="0"/>
@@ -10241,76 +10182,47 @@
           </a:p>
           <a:p>
             <a:r>
-              <a:rPr lang="en-US" sz="900" dirty="0" err="1" smtClean="0"/>
+              <a:rPr lang="en-US" sz="900" dirty="0" err="1"/>
               <a:t>SWIFT.wavespectra.energy</a:t>
             </a:r>
             <a:r>
               <a:rPr lang="en-US" sz="900" dirty="0"/>
-              <a:t>: wave energy spectral density, in m^2/Hz, as a function of </a:t>
-            </a:r>
-            <a:r>
-              <a:rPr lang="en-US" sz="900" dirty="0" smtClean="0"/>
-              <a:t> frequency</a:t>
-            </a:r>
-          </a:p>
-          <a:p>
-            <a:r>
-              <a:rPr lang="en-US" sz="900" dirty="0" err="1" smtClean="0"/>
+              <a:t>: wave energy spectral density, in m^2/Hz, as a function of  frequency</a:t>
+            </a:r>
+          </a:p>
+          <a:p>
+            <a:r>
+              <a:rPr lang="en-US" sz="900" dirty="0" err="1"/>
               <a:t>SWIFT.wavespectra.freq</a:t>
             </a:r>
             <a:r>
               <a:rPr lang="en-US" sz="900" dirty="0"/>
-              <a:t>: spectral frequencies, in </a:t>
-            </a:r>
-            <a:r>
-              <a:rPr lang="en-US" sz="900" dirty="0" smtClean="0"/>
-              <a:t>Hz</a:t>
-            </a:r>
-            <a:endParaRPr lang="en-US" sz="900" dirty="0"/>
+              <a:t>: spectral frequencies, in Hz</a:t>
+            </a:r>
           </a:p>
           <a:p>
             <a:r>
               <a:rPr lang="en-US" sz="900" dirty="0"/>
-              <a:t>SWIFT.wavespectra.a1: normalized spectral directional </a:t>
-            </a:r>
-            <a:r>
-              <a:rPr lang="en-US" sz="900" dirty="0" smtClean="0"/>
-              <a:t>moments</a:t>
-            </a:r>
-            <a:endParaRPr lang="en-US" sz="900" dirty="0"/>
+              <a:t>SWIFT.wavespectra.a1: normalized spectral directional moments</a:t>
+            </a:r>
           </a:p>
           <a:p>
             <a:r>
               <a:rPr lang="en-US" sz="900" dirty="0"/>
-              <a:t>SWIFT.wavespectra.b1: normalized spectral directional </a:t>
-            </a:r>
-            <a:r>
-              <a:rPr lang="en-US" sz="900" dirty="0" smtClean="0"/>
-              <a:t>moment</a:t>
-            </a:r>
-            <a:endParaRPr lang="en-US" sz="900" dirty="0"/>
+              <a:t>SWIFT.wavespectra.b1: normalized spectral directional moment</a:t>
+            </a:r>
           </a:p>
           <a:p>
             <a:r>
               <a:rPr lang="en-US" sz="900" dirty="0"/>
-              <a:t>SWIFT.wavespectra.a2: normalized spectral directional </a:t>
-            </a:r>
-            <a:r>
-              <a:rPr lang="en-US" sz="900" dirty="0" smtClean="0"/>
-              <a:t>moment</a:t>
-            </a:r>
-            <a:endParaRPr lang="en-US" sz="900" dirty="0"/>
+              <a:t>SWIFT.wavespectra.a2: normalized spectral directional moment</a:t>
+            </a:r>
           </a:p>
           <a:p>
             <a:r>
               <a:rPr lang="en-US" sz="900" dirty="0"/>
-              <a:t>SWIFT.wavespectra.b2: normalized spectral directional </a:t>
-            </a:r>
-            <a:r>
-              <a:rPr lang="en-US" sz="900" dirty="0" smtClean="0"/>
-              <a:t>moment</a:t>
-            </a:r>
-            <a:endParaRPr lang="en-US" sz="900" dirty="0"/>
+              <a:t>SWIFT.wavespectra.b2: normalized spectral directional moment</a:t>
+            </a:r>
           </a:p>
           <a:p>
             <a:r>
@@ -10319,13 +10231,8 @@
             </a:r>
             <a:r>
               <a:rPr lang="en-US" sz="900" dirty="0"/>
-              <a:t>: latitude in decimal </a:t>
-            </a:r>
-            <a:r>
-              <a:rPr lang="en-US" sz="900" dirty="0" smtClean="0"/>
-              <a:t>degrees</a:t>
-            </a:r>
-            <a:endParaRPr lang="en-US" sz="900" dirty="0"/>
+              <a:t>: latitude in decimal degrees</a:t>
+            </a:r>
           </a:p>
           <a:p>
             <a:r>
@@ -10334,13 +10241,8 @@
             </a:r>
             <a:r>
               <a:rPr lang="en-US" sz="900" dirty="0"/>
-              <a:t>: longitude in decimal </a:t>
-            </a:r>
-            <a:r>
-              <a:rPr lang="en-US" sz="900" dirty="0" smtClean="0"/>
-              <a:t>degrees</a:t>
-            </a:r>
-            <a:endParaRPr lang="en-US" sz="900" dirty="0"/>
+              <a:t>: longitude in decimal degrees</a:t>
+            </a:r>
           </a:p>
           <a:p>
             <a:r>
@@ -10357,13 +10259,8 @@
             </a:r>
             <a:r>
               <a:rPr lang="en-US" sz="900" dirty="0"/>
-              <a:t> C, at 0.5 m below the </a:t>
-            </a:r>
-            <a:r>
-              <a:rPr lang="en-US" sz="900" dirty="0" smtClean="0"/>
-              <a:t>surface</a:t>
-            </a:r>
-            <a:endParaRPr lang="en-US" sz="900" dirty="0"/>
+              <a:t> C, at 0.5 m below the surface</a:t>
+            </a:r>
           </a:p>
           <a:p>
             <a:r>
@@ -10372,13 +10269,8 @@
             </a:r>
             <a:r>
               <a:rPr lang="en-US" sz="900" dirty="0"/>
-              <a:t>: water salinity, in PSU, at 0.5 m below the </a:t>
-            </a:r>
-            <a:r>
-              <a:rPr lang="en-US" sz="900" dirty="0" smtClean="0"/>
-              <a:t>surface</a:t>
-            </a:r>
-            <a:endParaRPr lang="en-US" sz="900" dirty="0"/>
+              <a:t>: water salinity, in PSU, at 0.5 m below the surface</a:t>
+            </a:r>
           </a:p>
           <a:p>
             <a:r>
@@ -10398,7 +10290,7 @@
               <a:t> puck </a:t>
             </a:r>
             <a:r>
-              <a:rPr lang="en-US" sz="900" dirty="0" err="1" smtClean="0"/>
+              <a:rPr lang="en-US" sz="900" dirty="0" err="1"/>
               <a:t>flourometer</a:t>
             </a:r>
             <a:endParaRPr lang="en-US" sz="900" dirty="0"/>
@@ -10410,13 +10302,8 @@
             </a:r>
             <a:r>
               <a:rPr lang="en-US" sz="900" dirty="0"/>
-              <a:t>: drift direction TOWARDS, in degrees True (equivalent to "course over </a:t>
-            </a:r>
-            <a:r>
-              <a:rPr lang="en-US" sz="900" dirty="0" smtClean="0"/>
-              <a:t>ground”)</a:t>
-            </a:r>
-            <a:endParaRPr lang="en-US" sz="900" dirty="0"/>
+              <a:t>: drift direction TOWARDS, in degrees True (equivalent to "course over ground”)</a:t>
+            </a:r>
           </a:p>
           <a:p>
             <a:r>
@@ -10457,14 +10344,44 @@
           <a:lstStyle/>
           <a:p>
             <a:r>
-              <a:rPr lang="en-US" sz="1400" dirty="0" smtClean="0"/>
+              <a:rPr lang="en-US" sz="1400" dirty="0"/>
               <a:t>Raw (burst) file naming convention is </a:t>
             </a:r>
             <a:r>
-              <a:rPr lang="en-US" sz="1400" i="1" dirty="0" err="1" smtClean="0"/>
+              <a:rPr lang="en-US" sz="1400" i="1" dirty="0" err="1"/>
               <a:t>SWIFTXX_ZZZ_ddMonYear_HH_BN.dat</a:t>
             </a:r>
-            <a:endParaRPr lang="en-US" sz="1400" i="1" dirty="0" smtClean="0"/>
+            <a:endParaRPr lang="en-US" sz="1400" i="1" dirty="0"/>
+          </a:p>
+          <a:p>
+            <a:r>
+              <a:rPr lang="en-US" sz="1400" dirty="0"/>
+              <a:t>	where </a:t>
+            </a:r>
+            <a:r>
+              <a:rPr lang="en-US" sz="1400" i="1" dirty="0"/>
+              <a:t>XX</a:t>
+            </a:r>
+            <a:r>
+              <a:rPr lang="en-US" sz="1400" dirty="0"/>
+              <a:t> is the buoy serial number, </a:t>
+            </a:r>
+            <a:r>
+              <a:rPr lang="en-US" sz="1400" i="1" dirty="0"/>
+              <a:t>ZZZ</a:t>
+            </a:r>
+            <a:r>
+              <a:rPr lang="en-US" sz="1400" dirty="0"/>
+              <a:t> is the sensor, </a:t>
+            </a:r>
+            <a:r>
+              <a:rPr lang="en-US" sz="1400" i="1" dirty="0" err="1"/>
+              <a:t>ddMonYear</a:t>
+            </a:r>
+            <a:r>
+              <a:rPr lang="en-US" sz="1400" dirty="0"/>
+              <a:t> is the date,</a:t>
+            </a:r>
           </a:p>
           <a:p>
             <a:r>
@@ -10472,53 +10389,19 @@
               <a:t>	</a:t>
             </a:r>
             <a:r>
-              <a:rPr lang="en-US" sz="1400" dirty="0" smtClean="0"/>
-              <a:t>where </a:t>
-            </a:r>
-            <a:r>
-              <a:rPr lang="en-US" sz="1400" i="1" dirty="0" smtClean="0"/>
-              <a:t>XX</a:t>
-            </a:r>
-            <a:r>
-              <a:rPr lang="en-US" sz="1400" dirty="0" smtClean="0"/>
-              <a:t> is the buoy serial number, </a:t>
-            </a:r>
-            <a:r>
-              <a:rPr lang="en-US" sz="1400" i="1" dirty="0" smtClean="0"/>
-              <a:t>ZZZ</a:t>
-            </a:r>
-            <a:r>
-              <a:rPr lang="en-US" sz="1400" dirty="0" smtClean="0"/>
-              <a:t> is the sensor, </a:t>
-            </a:r>
-            <a:r>
-              <a:rPr lang="en-US" sz="1400" i="1" dirty="0" err="1" smtClean="0"/>
-              <a:t>ddMonYear</a:t>
-            </a:r>
-            <a:r>
-              <a:rPr lang="en-US" sz="1400" dirty="0" smtClean="0"/>
-              <a:t> is the date,</a:t>
-            </a:r>
-          </a:p>
-          <a:p>
+              <a:rPr lang="en-US" sz="1400" i="1" dirty="0"/>
+              <a:t>HH</a:t>
+            </a:r>
             <a:r>
               <a:rPr lang="en-US" sz="1400" dirty="0"/>
-              <a:t>	</a:t>
-            </a:r>
-            <a:r>
-              <a:rPr lang="en-US" sz="1400" i="1" dirty="0" smtClean="0"/>
-              <a:t>HH</a:t>
-            </a:r>
-            <a:r>
-              <a:rPr lang="en-US" sz="1400" dirty="0" smtClean="0"/>
               <a:t> is the hour (UTC), and </a:t>
             </a:r>
             <a:r>
-              <a:rPr lang="en-US" sz="1400" i="1" dirty="0" smtClean="0"/>
+              <a:rPr lang="en-US" sz="1400" i="1" dirty="0"/>
               <a:t>BN</a:t>
             </a:r>
             <a:r>
-              <a:rPr lang="en-US" sz="1400" dirty="0" smtClean="0"/>
+              <a:rPr lang="en-US" sz="1400" dirty="0"/>
               <a:t> is the burst number within that hour (1 to 5).</a:t>
             </a:r>
           </a:p>

</xml_diff>